<commit_message>
Last Update 18-09-2018 13:56:15.14
</commit_message>
<xml_diff>
--- a/Slides/Unit 1/Flow-Charts.pptx
+++ b/Slides/Unit 1/Flow-Charts.pptx
@@ -3062,6 +3062,1039 @@
           <a:chExt cx="0" cy="0"/>
         </a:xfrm>
       </p:grpSpPr>
+      <p:grpSp>
+        <p:nvGrpSpPr>
+          <p:cNvPr id="119" name="Group 118"/>
+          <p:cNvGrpSpPr/>
+          <p:nvPr/>
+        </p:nvGrpSpPr>
+        <p:grpSpPr>
+          <a:xfrm>
+            <a:off x="1071546" y="809596"/>
+            <a:ext cx="5429288" cy="7072362"/>
+            <a:chOff x="1071546" y="809596"/>
+            <a:chExt cx="5429288" cy="7072362"/>
+          </a:xfrm>
+        </p:grpSpPr>
+        <p:sp>
+          <p:nvSpPr>
+            <p:cNvPr id="3" name="Oval 2"/>
+            <p:cNvSpPr/>
+            <p:nvPr/>
+          </p:nvSpPr>
+          <p:spPr>
+            <a:xfrm>
+              <a:off x="2292652" y="809596"/>
+              <a:ext cx="1303334" cy="500066"/>
+            </a:xfrm>
+            <a:prstGeom prst="ellipse">
+              <a:avLst/>
+            </a:prstGeom>
+          </p:spPr>
+          <p:style>
+            <a:lnRef idx="2">
+              <a:schemeClr val="dk1"/>
+            </a:lnRef>
+            <a:fillRef idx="1">
+              <a:schemeClr val="lt1"/>
+            </a:fillRef>
+            <a:effectRef idx="0">
+              <a:schemeClr val="dk1"/>
+            </a:effectRef>
+            <a:fontRef idx="minor">
+              <a:schemeClr val="dk1"/>
+            </a:fontRef>
+          </p:style>
+          <p:txBody>
+            <a:bodyPr wrap="none" rtlCol="0" anchor="ctr"/>
+            <a:lstStyle/>
+            <a:p>
+              <a:pPr algn="ctr"/>
+              <a:r>
+                <a:rPr lang="en-IN" dirty="0" smtClean="0"/>
+                <a:t>start</a:t>
+              </a:r>
+              <a:endParaRPr lang="en-US" dirty="0"/>
+            </a:p>
+          </p:txBody>
+        </p:sp>
+        <p:sp>
+          <p:nvSpPr>
+            <p:cNvPr id="4" name="Flowchart: Data 3"/>
+            <p:cNvSpPr/>
+            <p:nvPr/>
+          </p:nvSpPr>
+          <p:spPr>
+            <a:xfrm>
+              <a:off x="1888110" y="1648992"/>
+              <a:ext cx="2112418" cy="500066"/>
+            </a:xfrm>
+            <a:prstGeom prst="flowChartInputOutput">
+              <a:avLst/>
+            </a:prstGeom>
+          </p:spPr>
+          <p:style>
+            <a:lnRef idx="2">
+              <a:schemeClr val="dk1"/>
+            </a:lnRef>
+            <a:fillRef idx="1">
+              <a:schemeClr val="lt1"/>
+            </a:fillRef>
+            <a:effectRef idx="0">
+              <a:schemeClr val="dk1"/>
+            </a:effectRef>
+            <a:fontRef idx="minor">
+              <a:schemeClr val="dk1"/>
+            </a:fontRef>
+          </p:style>
+          <p:txBody>
+            <a:bodyPr wrap="none" rtlCol="0" anchor="ctr"/>
+            <a:lstStyle/>
+            <a:p>
+              <a:pPr algn="ctr"/>
+              <a:r>
+                <a:rPr lang="en-IN" dirty="0" smtClean="0"/>
+                <a:t>read  year</a:t>
+              </a:r>
+              <a:endParaRPr lang="en-US" dirty="0"/>
+            </a:p>
+          </p:txBody>
+        </p:sp>
+        <p:cxnSp>
+          <p:nvCxnSpPr>
+            <p:cNvPr id="7" name="Straight Arrow Connector 6"/>
+            <p:cNvCxnSpPr/>
+            <p:nvPr/>
+          </p:nvCxnSpPr>
+          <p:spPr>
+            <a:xfrm rot="5400000">
+              <a:off x="2774654" y="1479327"/>
+              <a:ext cx="339330" cy="1588"/>
+            </a:xfrm>
+            <a:prstGeom prst="straightConnector1">
+              <a:avLst/>
+            </a:prstGeom>
+            <a:ln>
+              <a:tailEnd type="arrow"/>
+            </a:ln>
+          </p:spPr>
+          <p:style>
+            <a:lnRef idx="1">
+              <a:schemeClr val="dk1"/>
+            </a:lnRef>
+            <a:fillRef idx="0">
+              <a:schemeClr val="dk1"/>
+            </a:fillRef>
+            <a:effectRef idx="0">
+              <a:schemeClr val="dk1"/>
+            </a:effectRef>
+            <a:fontRef idx="minor">
+              <a:schemeClr val="tx1"/>
+            </a:fontRef>
+          </p:style>
+        </p:cxnSp>
+        <p:cxnSp>
+          <p:nvCxnSpPr>
+            <p:cNvPr id="8" name="Straight Arrow Connector 7"/>
+            <p:cNvCxnSpPr>
+              <a:stCxn id="4" idx="4"/>
+              <a:endCxn id="28" idx="0"/>
+            </p:cNvCxnSpPr>
+            <p:nvPr/>
+          </p:nvCxnSpPr>
+          <p:spPr>
+            <a:xfrm rot="5400000">
+              <a:off x="2828232" y="2265145"/>
+              <a:ext cx="232174" cy="1588"/>
+            </a:xfrm>
+            <a:prstGeom prst="straightConnector1">
+              <a:avLst/>
+            </a:prstGeom>
+            <a:ln>
+              <a:tailEnd type="arrow"/>
+            </a:ln>
+          </p:spPr>
+          <p:style>
+            <a:lnRef idx="1">
+              <a:schemeClr val="dk1"/>
+            </a:lnRef>
+            <a:fillRef idx="0">
+              <a:schemeClr val="dk1"/>
+            </a:fillRef>
+            <a:effectRef idx="0">
+              <a:schemeClr val="dk1"/>
+            </a:effectRef>
+            <a:fontRef idx="minor">
+              <a:schemeClr val="tx1"/>
+            </a:fontRef>
+          </p:style>
+        </p:cxnSp>
+        <p:sp>
+          <p:nvSpPr>
+            <p:cNvPr id="28" name="Flowchart: Decision 27"/>
+            <p:cNvSpPr/>
+            <p:nvPr/>
+          </p:nvSpPr>
+          <p:spPr>
+            <a:xfrm>
+              <a:off x="2066705" y="2381232"/>
+              <a:ext cx="1755228" cy="1000132"/>
+            </a:xfrm>
+            <a:prstGeom prst="flowChartDecision">
+              <a:avLst/>
+            </a:prstGeom>
+          </p:spPr>
+          <p:style>
+            <a:lnRef idx="2">
+              <a:schemeClr val="dk1"/>
+            </a:lnRef>
+            <a:fillRef idx="1">
+              <a:schemeClr val="lt1"/>
+            </a:fillRef>
+            <a:effectRef idx="0">
+              <a:schemeClr val="dk1"/>
+            </a:effectRef>
+            <a:fontRef idx="minor">
+              <a:schemeClr val="dk1"/>
+            </a:fontRef>
+          </p:style>
+          <p:txBody>
+            <a:bodyPr wrap="none" rtlCol="0" anchor="ctr"/>
+            <a:lstStyle/>
+            <a:p>
+              <a:pPr algn="ctr"/>
+              <a:endParaRPr lang="en-IN" dirty="0" smtClean="0"/>
+            </a:p>
+            <a:p>
+              <a:pPr algn="ctr"/>
+              <a:r>
+                <a:rPr lang="en-IN" dirty="0" smtClean="0"/>
+                <a:t>year % 4 = 0</a:t>
+              </a:r>
+            </a:p>
+            <a:p>
+              <a:pPr algn="ctr"/>
+              <a:r>
+                <a:rPr lang="en-IN" dirty="0" smtClean="0"/>
+                <a:t>?</a:t>
+              </a:r>
+              <a:endParaRPr lang="en-US" dirty="0"/>
+            </a:p>
+          </p:txBody>
+        </p:sp>
+        <p:sp>
+          <p:nvSpPr>
+            <p:cNvPr id="32" name="Flowchart: Decision 31"/>
+            <p:cNvSpPr/>
+            <p:nvPr/>
+          </p:nvSpPr>
+          <p:spPr>
+            <a:xfrm>
+              <a:off x="2066705" y="3667116"/>
+              <a:ext cx="1755228" cy="1000132"/>
+            </a:xfrm>
+            <a:prstGeom prst="flowChartDecision">
+              <a:avLst/>
+            </a:prstGeom>
+          </p:spPr>
+          <p:style>
+            <a:lnRef idx="2">
+              <a:schemeClr val="dk1"/>
+            </a:lnRef>
+            <a:fillRef idx="1">
+              <a:schemeClr val="lt1"/>
+            </a:fillRef>
+            <a:effectRef idx="0">
+              <a:schemeClr val="dk1"/>
+            </a:effectRef>
+            <a:fontRef idx="minor">
+              <a:schemeClr val="dk1"/>
+            </a:fontRef>
+          </p:style>
+          <p:txBody>
+            <a:bodyPr wrap="none" rtlCol="0" anchor="ctr"/>
+            <a:lstStyle/>
+            <a:p>
+              <a:pPr algn="ctr"/>
+              <a:endParaRPr lang="en-IN" dirty="0" smtClean="0"/>
+            </a:p>
+            <a:p>
+              <a:pPr algn="ctr"/>
+              <a:r>
+                <a:rPr lang="en-IN" dirty="0" smtClean="0"/>
+                <a:t>year % 100 = 0</a:t>
+              </a:r>
+            </a:p>
+            <a:p>
+              <a:pPr algn="ctr"/>
+              <a:r>
+                <a:rPr lang="en-IN" dirty="0" smtClean="0"/>
+                <a:t>?</a:t>
+              </a:r>
+              <a:endParaRPr lang="en-US" dirty="0"/>
+            </a:p>
+          </p:txBody>
+        </p:sp>
+        <p:sp>
+          <p:nvSpPr>
+            <p:cNvPr id="33" name="Flowchart: Decision 32"/>
+            <p:cNvSpPr/>
+            <p:nvPr/>
+          </p:nvSpPr>
+          <p:spPr>
+            <a:xfrm>
+              <a:off x="1979906" y="4953000"/>
+              <a:ext cx="1928826" cy="1000132"/>
+            </a:xfrm>
+            <a:prstGeom prst="flowChartDecision">
+              <a:avLst/>
+            </a:prstGeom>
+          </p:spPr>
+          <p:style>
+            <a:lnRef idx="2">
+              <a:schemeClr val="dk1"/>
+            </a:lnRef>
+            <a:fillRef idx="1">
+              <a:schemeClr val="lt1"/>
+            </a:fillRef>
+            <a:effectRef idx="0">
+              <a:schemeClr val="dk1"/>
+            </a:effectRef>
+            <a:fontRef idx="minor">
+              <a:schemeClr val="dk1"/>
+            </a:fontRef>
+          </p:style>
+          <p:txBody>
+            <a:bodyPr wrap="none" rtlCol="0" anchor="ctr"/>
+            <a:lstStyle/>
+            <a:p>
+              <a:pPr algn="ctr"/>
+              <a:endParaRPr lang="en-IN" dirty="0" smtClean="0"/>
+            </a:p>
+            <a:p>
+              <a:pPr algn="ctr"/>
+              <a:r>
+                <a:rPr lang="en-IN" dirty="0" smtClean="0"/>
+                <a:t>year % 400 = 0</a:t>
+              </a:r>
+            </a:p>
+            <a:p>
+              <a:pPr algn="ctr"/>
+              <a:r>
+                <a:rPr lang="en-IN" dirty="0" smtClean="0"/>
+                <a:t>?</a:t>
+              </a:r>
+              <a:endParaRPr lang="en-US" dirty="0"/>
+            </a:p>
+          </p:txBody>
+        </p:sp>
+        <p:sp>
+          <p:nvSpPr>
+            <p:cNvPr id="34" name="Flowchart: Display 33"/>
+            <p:cNvSpPr/>
+            <p:nvPr/>
+          </p:nvSpPr>
+          <p:spPr>
+            <a:xfrm>
+              <a:off x="1959572" y="6381760"/>
+              <a:ext cx="1969494" cy="642942"/>
+            </a:xfrm>
+            <a:prstGeom prst="flowChartDisplay">
+              <a:avLst/>
+            </a:prstGeom>
+          </p:spPr>
+          <p:style>
+            <a:lnRef idx="2">
+              <a:schemeClr val="dk1"/>
+            </a:lnRef>
+            <a:fillRef idx="1">
+              <a:schemeClr val="lt1"/>
+            </a:fillRef>
+            <a:effectRef idx="0">
+              <a:schemeClr val="dk1"/>
+            </a:effectRef>
+            <a:fontRef idx="minor">
+              <a:schemeClr val="dk1"/>
+            </a:fontRef>
+          </p:style>
+          <p:txBody>
+            <a:bodyPr wrap="none" rtlCol="0" anchor="ctr"/>
+            <a:lstStyle/>
+            <a:p>
+              <a:pPr algn="ctr"/>
+              <a:r>
+                <a:rPr lang="en-IN" dirty="0" smtClean="0"/>
+                <a:t>Leap Year </a:t>
+              </a:r>
+              <a:endParaRPr lang="en-US" dirty="0"/>
+            </a:p>
+          </p:txBody>
+        </p:sp>
+        <p:cxnSp>
+          <p:nvCxnSpPr>
+            <p:cNvPr id="35" name="Straight Arrow Connector 34"/>
+            <p:cNvCxnSpPr/>
+            <p:nvPr/>
+          </p:nvCxnSpPr>
+          <p:spPr>
+            <a:xfrm rot="5400000">
+              <a:off x="2801443" y="3524240"/>
+              <a:ext cx="285752" cy="1588"/>
+            </a:xfrm>
+            <a:prstGeom prst="straightConnector1">
+              <a:avLst/>
+            </a:prstGeom>
+            <a:ln>
+              <a:tailEnd type="arrow"/>
+            </a:ln>
+          </p:spPr>
+          <p:style>
+            <a:lnRef idx="1">
+              <a:schemeClr val="dk1"/>
+            </a:lnRef>
+            <a:fillRef idx="0">
+              <a:schemeClr val="dk1"/>
+            </a:fillRef>
+            <a:effectRef idx="0">
+              <a:schemeClr val="dk1"/>
+            </a:effectRef>
+            <a:fontRef idx="minor">
+              <a:schemeClr val="tx1"/>
+            </a:fontRef>
+          </p:style>
+        </p:cxnSp>
+        <p:cxnSp>
+          <p:nvCxnSpPr>
+            <p:cNvPr id="38" name="Straight Arrow Connector 37"/>
+            <p:cNvCxnSpPr/>
+            <p:nvPr/>
+          </p:nvCxnSpPr>
+          <p:spPr>
+            <a:xfrm rot="5400000">
+              <a:off x="2801443" y="4810124"/>
+              <a:ext cx="285752" cy="1588"/>
+            </a:xfrm>
+            <a:prstGeom prst="straightConnector1">
+              <a:avLst/>
+            </a:prstGeom>
+            <a:ln>
+              <a:tailEnd type="arrow"/>
+            </a:ln>
+          </p:spPr>
+          <p:style>
+            <a:lnRef idx="1">
+              <a:schemeClr val="dk1"/>
+            </a:lnRef>
+            <a:fillRef idx="0">
+              <a:schemeClr val="dk1"/>
+            </a:fillRef>
+            <a:effectRef idx="0">
+              <a:schemeClr val="dk1"/>
+            </a:effectRef>
+            <a:fontRef idx="minor">
+              <a:schemeClr val="tx1"/>
+            </a:fontRef>
+          </p:style>
+        </p:cxnSp>
+        <p:cxnSp>
+          <p:nvCxnSpPr>
+            <p:cNvPr id="41" name="Straight Arrow Connector 40"/>
+            <p:cNvCxnSpPr>
+              <a:stCxn id="33" idx="2"/>
+              <a:endCxn id="34" idx="0"/>
+            </p:cNvCxnSpPr>
+            <p:nvPr/>
+          </p:nvCxnSpPr>
+          <p:spPr>
+            <a:xfrm rot="5400000">
+              <a:off x="2730005" y="6167446"/>
+              <a:ext cx="428628" cy="1588"/>
+            </a:xfrm>
+            <a:prstGeom prst="straightConnector1">
+              <a:avLst/>
+            </a:prstGeom>
+            <a:ln>
+              <a:tailEnd type="arrow"/>
+            </a:ln>
+          </p:spPr>
+          <p:style>
+            <a:lnRef idx="1">
+              <a:schemeClr val="dk1"/>
+            </a:lnRef>
+            <a:fillRef idx="0">
+              <a:schemeClr val="dk1"/>
+            </a:fillRef>
+            <a:effectRef idx="0">
+              <a:schemeClr val="dk1"/>
+            </a:effectRef>
+            <a:fontRef idx="minor">
+              <a:schemeClr val="tx1"/>
+            </a:fontRef>
+          </p:style>
+        </p:cxnSp>
+        <p:sp>
+          <p:nvSpPr>
+            <p:cNvPr id="69" name="Flowchart: Display 68"/>
+            <p:cNvSpPr/>
+            <p:nvPr/>
+          </p:nvSpPr>
+          <p:spPr>
+            <a:xfrm>
+              <a:off x="4773622" y="6024570"/>
+              <a:ext cx="1727212" cy="785818"/>
+            </a:xfrm>
+            <a:prstGeom prst="flowChartDisplay">
+              <a:avLst/>
+            </a:prstGeom>
+          </p:spPr>
+          <p:style>
+            <a:lnRef idx="2">
+              <a:schemeClr val="dk1"/>
+            </a:lnRef>
+            <a:fillRef idx="1">
+              <a:schemeClr val="lt1"/>
+            </a:fillRef>
+            <a:effectRef idx="0">
+              <a:schemeClr val="dk1"/>
+            </a:effectRef>
+            <a:fontRef idx="minor">
+              <a:schemeClr val="dk1"/>
+            </a:fontRef>
+          </p:style>
+          <p:txBody>
+            <a:bodyPr wrap="none" rtlCol="0" anchor="ctr"/>
+            <a:lstStyle/>
+            <a:p>
+              <a:pPr algn="ctr"/>
+              <a:r>
+                <a:rPr lang="en-IN" dirty="0" smtClean="0"/>
+                <a:t>Not Leap Year</a:t>
+              </a:r>
+              <a:endParaRPr lang="en-US" dirty="0"/>
+            </a:p>
+          </p:txBody>
+        </p:sp>
+        <p:sp>
+          <p:nvSpPr>
+            <p:cNvPr id="70" name="Oval 69"/>
+            <p:cNvSpPr/>
+            <p:nvPr/>
+          </p:nvSpPr>
+          <p:spPr>
+            <a:xfrm>
+              <a:off x="2285992" y="7381892"/>
+              <a:ext cx="1303334" cy="500066"/>
+            </a:xfrm>
+            <a:prstGeom prst="ellipse">
+              <a:avLst/>
+            </a:prstGeom>
+          </p:spPr>
+          <p:style>
+            <a:lnRef idx="2">
+              <a:schemeClr val="dk1"/>
+            </a:lnRef>
+            <a:fillRef idx="1">
+              <a:schemeClr val="lt1"/>
+            </a:fillRef>
+            <a:effectRef idx="0">
+              <a:schemeClr val="dk1"/>
+            </a:effectRef>
+            <a:fontRef idx="minor">
+              <a:schemeClr val="dk1"/>
+            </a:fontRef>
+          </p:style>
+          <p:txBody>
+            <a:bodyPr wrap="none" rtlCol="0" anchor="ctr"/>
+            <a:lstStyle/>
+            <a:p>
+              <a:pPr algn="ctr"/>
+              <a:r>
+                <a:rPr lang="en-IN" dirty="0" smtClean="0"/>
+                <a:t>stop</a:t>
+              </a:r>
+              <a:endParaRPr lang="en-US" dirty="0"/>
+            </a:p>
+          </p:txBody>
+        </p:sp>
+        <p:cxnSp>
+          <p:nvCxnSpPr>
+            <p:cNvPr id="71" name="Straight Arrow Connector 70"/>
+            <p:cNvCxnSpPr>
+              <a:stCxn id="34" idx="2"/>
+              <a:endCxn id="70" idx="0"/>
+            </p:cNvCxnSpPr>
+            <p:nvPr/>
+          </p:nvCxnSpPr>
+          <p:spPr>
+            <a:xfrm rot="5400000">
+              <a:off x="2762394" y="7199967"/>
+              <a:ext cx="357190" cy="6660"/>
+            </a:xfrm>
+            <a:prstGeom prst="straightConnector1">
+              <a:avLst/>
+            </a:prstGeom>
+            <a:ln>
+              <a:tailEnd type="arrow"/>
+            </a:ln>
+          </p:spPr>
+          <p:style>
+            <a:lnRef idx="1">
+              <a:schemeClr val="dk1"/>
+            </a:lnRef>
+            <a:fillRef idx="0">
+              <a:schemeClr val="dk1"/>
+            </a:fillRef>
+            <a:effectRef idx="0">
+              <a:schemeClr val="dk1"/>
+            </a:effectRef>
+            <a:fontRef idx="minor">
+              <a:schemeClr val="tx1"/>
+            </a:fontRef>
+          </p:style>
+        </p:cxnSp>
+        <p:cxnSp>
+          <p:nvCxnSpPr>
+            <p:cNvPr id="77" name="Elbow Connector 76"/>
+            <p:cNvCxnSpPr>
+              <a:stCxn id="32" idx="1"/>
+              <a:endCxn id="34" idx="1"/>
+            </p:cNvCxnSpPr>
+            <p:nvPr/>
+          </p:nvCxnSpPr>
+          <p:spPr>
+            <a:xfrm rot="10800000" flipV="1">
+              <a:off x="1959573" y="4167181"/>
+              <a:ext cx="107133" cy="2536049"/>
+            </a:xfrm>
+            <a:prstGeom prst="bentConnector3">
+              <a:avLst>
+                <a:gd name="adj1" fmla="val 313380"/>
+              </a:avLst>
+            </a:prstGeom>
+            <a:ln>
+              <a:tailEnd type="arrow"/>
+            </a:ln>
+          </p:spPr>
+          <p:style>
+            <a:lnRef idx="1">
+              <a:schemeClr val="dk1"/>
+            </a:lnRef>
+            <a:fillRef idx="0">
+              <a:schemeClr val="dk1"/>
+            </a:fillRef>
+            <a:effectRef idx="0">
+              <a:schemeClr val="dk1"/>
+            </a:effectRef>
+            <a:fontRef idx="minor">
+              <a:schemeClr val="tx1"/>
+            </a:fontRef>
+          </p:style>
+        </p:cxnSp>
+        <p:cxnSp>
+          <p:nvCxnSpPr>
+            <p:cNvPr id="83" name="Elbow Connector 77"/>
+            <p:cNvCxnSpPr>
+              <a:stCxn id="69" idx="2"/>
+              <a:endCxn id="70" idx="6"/>
+            </p:cNvCxnSpPr>
+            <p:nvPr/>
+          </p:nvCxnSpPr>
+          <p:spPr>
+            <a:xfrm rot="5400000">
+              <a:off x="4202509" y="6197205"/>
+              <a:ext cx="821537" cy="2047902"/>
+            </a:xfrm>
+            <a:prstGeom prst="bentConnector2">
+              <a:avLst/>
+            </a:prstGeom>
+            <a:ln>
+              <a:tailEnd type="arrow"/>
+            </a:ln>
+          </p:spPr>
+          <p:style>
+            <a:lnRef idx="1">
+              <a:schemeClr val="dk1"/>
+            </a:lnRef>
+            <a:fillRef idx="0">
+              <a:schemeClr val="dk1"/>
+            </a:fillRef>
+            <a:effectRef idx="0">
+              <a:schemeClr val="dk1"/>
+            </a:effectRef>
+            <a:fontRef idx="minor">
+              <a:schemeClr val="tx1"/>
+            </a:fontRef>
+          </p:style>
+        </p:cxnSp>
+        <p:sp>
+          <p:nvSpPr>
+            <p:cNvPr id="87" name="Oval 86"/>
+            <p:cNvSpPr/>
+            <p:nvPr/>
+          </p:nvSpPr>
+          <p:spPr>
+            <a:xfrm>
+              <a:off x="5374103" y="5205414"/>
+              <a:ext cx="500066" cy="500066"/>
+            </a:xfrm>
+            <a:prstGeom prst="ellipse">
+              <a:avLst/>
+            </a:prstGeom>
+          </p:spPr>
+          <p:style>
+            <a:lnRef idx="2">
+              <a:schemeClr val="dk1"/>
+            </a:lnRef>
+            <a:fillRef idx="1">
+              <a:schemeClr val="lt1"/>
+            </a:fillRef>
+            <a:effectRef idx="0">
+              <a:schemeClr val="dk1"/>
+            </a:effectRef>
+            <a:fontRef idx="minor">
+              <a:schemeClr val="dk1"/>
+            </a:fontRef>
+          </p:style>
+          <p:txBody>
+            <a:bodyPr wrap="none" rtlCol="0" anchor="ctr"/>
+            <a:lstStyle/>
+            <a:p>
+              <a:pPr algn="ctr"/>
+              <a:endParaRPr lang="en-US" dirty="0"/>
+            </a:p>
+          </p:txBody>
+        </p:sp>
+        <p:cxnSp>
+          <p:nvCxnSpPr>
+            <p:cNvPr id="88" name="Straight Arrow Connector 87"/>
+            <p:cNvCxnSpPr>
+              <a:stCxn id="33" idx="3"/>
+              <a:endCxn id="87" idx="2"/>
+            </p:cNvCxnSpPr>
+            <p:nvPr/>
+          </p:nvCxnSpPr>
+          <p:spPr>
+            <a:xfrm>
+              <a:off x="3908732" y="5453066"/>
+              <a:ext cx="1465371" cy="2381"/>
+            </a:xfrm>
+            <a:prstGeom prst="straightConnector1">
+              <a:avLst/>
+            </a:prstGeom>
+            <a:ln>
+              <a:tailEnd type="arrow"/>
+            </a:ln>
+          </p:spPr>
+          <p:style>
+            <a:lnRef idx="1">
+              <a:schemeClr val="dk1"/>
+            </a:lnRef>
+            <a:fillRef idx="0">
+              <a:schemeClr val="dk1"/>
+            </a:fillRef>
+            <a:effectRef idx="0">
+              <a:schemeClr val="dk1"/>
+            </a:effectRef>
+            <a:fontRef idx="minor">
+              <a:schemeClr val="tx1"/>
+            </a:fontRef>
+          </p:style>
+        </p:cxnSp>
+        <p:cxnSp>
+          <p:nvCxnSpPr>
+            <p:cNvPr id="91" name="Straight Arrow Connector 90"/>
+            <p:cNvCxnSpPr>
+              <a:stCxn id="87" idx="4"/>
+              <a:endCxn id="69" idx="0"/>
+            </p:cNvCxnSpPr>
+            <p:nvPr/>
+          </p:nvCxnSpPr>
+          <p:spPr>
+            <a:xfrm rot="16200000" flipH="1">
+              <a:off x="5471137" y="5858479"/>
+              <a:ext cx="319090" cy="13092"/>
+            </a:xfrm>
+            <a:prstGeom prst="straightConnector1">
+              <a:avLst/>
+            </a:prstGeom>
+            <a:ln>
+              <a:tailEnd type="arrow"/>
+            </a:ln>
+          </p:spPr>
+          <p:style>
+            <a:lnRef idx="1">
+              <a:schemeClr val="dk1"/>
+            </a:lnRef>
+            <a:fillRef idx="0">
+              <a:schemeClr val="dk1"/>
+            </a:fillRef>
+            <a:effectRef idx="0">
+              <a:schemeClr val="dk1"/>
+            </a:effectRef>
+            <a:fontRef idx="minor">
+              <a:schemeClr val="tx1"/>
+            </a:fontRef>
+          </p:style>
+        </p:cxnSp>
+        <p:cxnSp>
+          <p:nvCxnSpPr>
+            <p:cNvPr id="95" name="Elbow Connector 77"/>
+            <p:cNvCxnSpPr>
+              <a:stCxn id="28" idx="3"/>
+              <a:endCxn id="87" idx="0"/>
+            </p:cNvCxnSpPr>
+            <p:nvPr/>
+          </p:nvCxnSpPr>
+          <p:spPr>
+            <a:xfrm>
+              <a:off x="3821933" y="2881298"/>
+              <a:ext cx="1802203" cy="2324116"/>
+            </a:xfrm>
+            <a:prstGeom prst="bentConnector2">
+              <a:avLst/>
+            </a:prstGeom>
+            <a:ln>
+              <a:tailEnd type="arrow"/>
+            </a:ln>
+          </p:spPr>
+          <p:style>
+            <a:lnRef idx="1">
+              <a:schemeClr val="dk1"/>
+            </a:lnRef>
+            <a:fillRef idx="0">
+              <a:schemeClr val="dk1"/>
+            </a:fillRef>
+            <a:effectRef idx="0">
+              <a:schemeClr val="dk1"/>
+            </a:effectRef>
+            <a:fontRef idx="minor">
+              <a:schemeClr val="tx1"/>
+            </a:fontRef>
+          </p:style>
+        </p:cxnSp>
+        <p:sp>
+          <p:nvSpPr>
+            <p:cNvPr id="99" name="TextBox 98"/>
+            <p:cNvSpPr txBox="1"/>
+            <p:nvPr/>
+          </p:nvSpPr>
+          <p:spPr>
+            <a:xfrm>
+              <a:off x="2928934" y="3309926"/>
+              <a:ext cx="607218" cy="369332"/>
+            </a:xfrm>
+            <a:prstGeom prst="rect">
+              <a:avLst/>
+            </a:prstGeom>
+            <a:noFill/>
+          </p:spPr>
+          <p:txBody>
+            <a:bodyPr wrap="none" rtlCol="0">
+              <a:spAutoFit/>
+            </a:bodyPr>
+            <a:lstStyle/>
+            <a:p>
+              <a:r>
+                <a:rPr lang="en-IN" i="1" dirty="0" smtClean="0"/>
+                <a:t>True</a:t>
+              </a:r>
+              <a:endParaRPr lang="en-US" i="1" dirty="0"/>
+            </a:p>
+          </p:txBody>
+        </p:sp>
+        <p:sp>
+          <p:nvSpPr>
+            <p:cNvPr id="100" name="TextBox 99"/>
+            <p:cNvSpPr txBox="1"/>
+            <p:nvPr/>
+          </p:nvSpPr>
+          <p:spPr>
+            <a:xfrm>
+              <a:off x="2928934" y="4583668"/>
+              <a:ext cx="607218" cy="369332"/>
+            </a:xfrm>
+            <a:prstGeom prst="rect">
+              <a:avLst/>
+            </a:prstGeom>
+            <a:noFill/>
+          </p:spPr>
+          <p:txBody>
+            <a:bodyPr wrap="none" rtlCol="0">
+              <a:spAutoFit/>
+            </a:bodyPr>
+            <a:lstStyle/>
+            <a:p>
+              <a:r>
+                <a:rPr lang="en-IN" i="1" dirty="0" smtClean="0"/>
+                <a:t>True</a:t>
+              </a:r>
+              <a:endParaRPr lang="en-US" i="1" dirty="0"/>
+            </a:p>
+          </p:txBody>
+        </p:sp>
+        <p:sp>
+          <p:nvSpPr>
+            <p:cNvPr id="101" name="TextBox 100"/>
+            <p:cNvSpPr txBox="1"/>
+            <p:nvPr/>
+          </p:nvSpPr>
+          <p:spPr>
+            <a:xfrm>
+              <a:off x="3178972" y="5869552"/>
+              <a:ext cx="607218" cy="369332"/>
+            </a:xfrm>
+            <a:prstGeom prst="rect">
+              <a:avLst/>
+            </a:prstGeom>
+            <a:noFill/>
+          </p:spPr>
+          <p:txBody>
+            <a:bodyPr wrap="none" rtlCol="0">
+              <a:spAutoFit/>
+            </a:bodyPr>
+            <a:lstStyle/>
+            <a:p>
+              <a:r>
+                <a:rPr lang="en-IN" i="1" dirty="0" smtClean="0"/>
+                <a:t>True</a:t>
+              </a:r>
+              <a:endParaRPr lang="en-US" i="1" dirty="0"/>
+            </a:p>
+          </p:txBody>
+        </p:sp>
+        <p:sp>
+          <p:nvSpPr>
+            <p:cNvPr id="102" name="TextBox 101"/>
+            <p:cNvSpPr txBox="1"/>
+            <p:nvPr/>
+          </p:nvSpPr>
+          <p:spPr>
+            <a:xfrm>
+              <a:off x="4286256" y="2511966"/>
+              <a:ext cx="659219" cy="369332"/>
+            </a:xfrm>
+            <a:prstGeom prst="rect">
+              <a:avLst/>
+            </a:prstGeom>
+            <a:noFill/>
+          </p:spPr>
+          <p:txBody>
+            <a:bodyPr wrap="none" rtlCol="0">
+              <a:spAutoFit/>
+            </a:bodyPr>
+            <a:lstStyle/>
+            <a:p>
+              <a:r>
+                <a:rPr lang="en-IN" i="1" dirty="0" smtClean="0"/>
+                <a:t>False</a:t>
+              </a:r>
+              <a:endParaRPr lang="en-US" i="1" dirty="0"/>
+            </a:p>
+          </p:txBody>
+        </p:sp>
+        <p:sp>
+          <p:nvSpPr>
+            <p:cNvPr id="104" name="TextBox 103"/>
+            <p:cNvSpPr txBox="1"/>
+            <p:nvPr/>
+          </p:nvSpPr>
+          <p:spPr>
+            <a:xfrm>
+              <a:off x="4302533" y="5083734"/>
+              <a:ext cx="659219" cy="369332"/>
+            </a:xfrm>
+            <a:prstGeom prst="rect">
+              <a:avLst/>
+            </a:prstGeom>
+            <a:noFill/>
+          </p:spPr>
+          <p:txBody>
+            <a:bodyPr wrap="none" rtlCol="0">
+              <a:spAutoFit/>
+            </a:bodyPr>
+            <a:lstStyle/>
+            <a:p>
+              <a:r>
+                <a:rPr lang="en-IN" i="1" dirty="0" smtClean="0"/>
+                <a:t>False</a:t>
+              </a:r>
+              <a:endParaRPr lang="en-US" i="1" dirty="0"/>
+            </a:p>
+          </p:txBody>
+        </p:sp>
+        <p:sp>
+          <p:nvSpPr>
+            <p:cNvPr id="105" name="TextBox 104"/>
+            <p:cNvSpPr txBox="1"/>
+            <p:nvPr/>
+          </p:nvSpPr>
+          <p:spPr>
+            <a:xfrm>
+              <a:off x="1071546" y="4869420"/>
+              <a:ext cx="659219" cy="369332"/>
+            </a:xfrm>
+            <a:prstGeom prst="rect">
+              <a:avLst/>
+            </a:prstGeom>
+            <a:noFill/>
+          </p:spPr>
+          <p:txBody>
+            <a:bodyPr wrap="none" rtlCol="0">
+              <a:spAutoFit/>
+            </a:bodyPr>
+            <a:lstStyle/>
+            <a:p>
+              <a:r>
+                <a:rPr lang="en-IN" i="1" dirty="0" smtClean="0"/>
+                <a:t>False</a:t>
+              </a:r>
+              <a:endParaRPr lang="en-US" i="1" dirty="0"/>
+            </a:p>
+          </p:txBody>
+        </p:sp>
+      </p:grpSp>
+      <p:sp>
+        <p:nvSpPr>
+          <p:cNvPr id="29" name="Rectangle 28"/>
+          <p:cNvSpPr/>
+          <p:nvPr/>
+        </p:nvSpPr>
+        <p:spPr>
+          <a:xfrm>
+            <a:off x="4286256" y="523844"/>
+            <a:ext cx="2286016" cy="500066"/>
+          </a:xfrm>
+          <a:prstGeom prst="rect">
+            <a:avLst/>
+          </a:prstGeom>
+        </p:spPr>
+        <p:style>
+          <a:lnRef idx="2">
+            <a:schemeClr val="accent6"/>
+          </a:lnRef>
+          <a:fillRef idx="1">
+            <a:schemeClr val="lt1"/>
+          </a:fillRef>
+          <a:effectRef idx="0">
+            <a:schemeClr val="accent6"/>
+          </a:effectRef>
+          <a:fontRef idx="minor">
+            <a:schemeClr val="dk1"/>
+          </a:fontRef>
+        </p:style>
+        <p:txBody>
+          <a:bodyPr rtlCol="0" anchor="ctr"/>
+          <a:lstStyle/>
+          <a:p>
+            <a:pPr algn="ctr"/>
+            <a:r>
+              <a:rPr lang="en-IN" dirty="0" smtClean="0"/>
+              <a:t>Leap Year Finder</a:t>
+            </a:r>
+            <a:endParaRPr lang="en-US" dirty="0"/>
+          </a:p>
+        </p:txBody>
+      </p:sp>
     </p:spTree>
   </p:cSld>
   <p:clrMapOvr>
@@ -4040,6 +5073,48 @@
           </p:txBody>
         </p:sp>
       </p:grpSp>
+      <p:sp>
+        <p:nvSpPr>
+          <p:cNvPr id="28" name="Rectangle 27"/>
+          <p:cNvSpPr/>
+          <p:nvPr/>
+        </p:nvSpPr>
+        <p:spPr>
+          <a:xfrm>
+            <a:off x="4286256" y="523844"/>
+            <a:ext cx="2286016" cy="500066"/>
+          </a:xfrm>
+          <a:prstGeom prst="rect">
+            <a:avLst/>
+          </a:prstGeom>
+        </p:spPr>
+        <p:style>
+          <a:lnRef idx="2">
+            <a:schemeClr val="accent6"/>
+          </a:lnRef>
+          <a:fillRef idx="1">
+            <a:schemeClr val="lt1"/>
+          </a:fillRef>
+          <a:effectRef idx="0">
+            <a:schemeClr val="accent6"/>
+          </a:effectRef>
+          <a:fontRef idx="minor">
+            <a:schemeClr val="dk1"/>
+          </a:fontRef>
+        </p:style>
+        <p:txBody>
+          <a:bodyPr rtlCol="0" anchor="ctr"/>
+          <a:lstStyle/>
+          <a:p>
+            <a:pPr algn="ctr"/>
+            <a:r>
+              <a:rPr lang="en-IN" dirty="0" smtClean="0"/>
+              <a:t>GCD Finder</a:t>
+            </a:r>
+            <a:endParaRPr lang="en-US" dirty="0"/>
+          </a:p>
+        </p:txBody>
+      </p:sp>
     </p:spTree>
   </p:cSld>
   <p:clrMapOvr>
@@ -4847,6 +5922,48 @@
           </p:txBody>
         </p:sp>
       </p:grpSp>
+      <p:sp>
+        <p:nvSpPr>
+          <p:cNvPr id="23" name="Rectangle 22"/>
+          <p:cNvSpPr/>
+          <p:nvPr/>
+        </p:nvSpPr>
+        <p:spPr>
+          <a:xfrm>
+            <a:off x="4286256" y="523844"/>
+            <a:ext cx="2286016" cy="500066"/>
+          </a:xfrm>
+          <a:prstGeom prst="rect">
+            <a:avLst/>
+          </a:prstGeom>
+        </p:spPr>
+        <p:style>
+          <a:lnRef idx="2">
+            <a:schemeClr val="accent6"/>
+          </a:lnRef>
+          <a:fillRef idx="1">
+            <a:schemeClr val="lt1"/>
+          </a:fillRef>
+          <a:effectRef idx="0">
+            <a:schemeClr val="accent6"/>
+          </a:effectRef>
+          <a:fontRef idx="minor">
+            <a:schemeClr val="dk1"/>
+          </a:fontRef>
+        </p:style>
+        <p:txBody>
+          <a:bodyPr rtlCol="0" anchor="ctr"/>
+          <a:lstStyle/>
+          <a:p>
+            <a:pPr algn="ctr"/>
+            <a:r>
+              <a:rPr lang="en-IN" dirty="0" smtClean="0"/>
+              <a:t>Square Root Finder</a:t>
+            </a:r>
+            <a:endParaRPr lang="en-US" dirty="0"/>
+          </a:p>
+        </p:txBody>
+      </p:sp>
     </p:spTree>
   </p:cSld>
   <p:clrMapOvr>
@@ -4968,11 +6085,7 @@
               <a:pPr algn="ctr"/>
               <a:r>
                 <a:rPr lang="en-IN" dirty="0" smtClean="0"/>
-                <a:t>m</a:t>
-              </a:r>
-              <a:r>
-                <a:rPr lang="en-IN" dirty="0" smtClean="0"/>
-                <a:t>in&gt;=</a:t>
+                <a:t>min&gt;=</a:t>
               </a:r>
               <a:r>
                 <a:rPr lang="en-IN" dirty="0" err="1" smtClean="0"/>
@@ -5026,11 +6139,7 @@
               <a:pPr algn="ctr"/>
               <a:r>
                 <a:rPr lang="en-IN" dirty="0" err="1" smtClean="0"/>
-                <a:t>m</a:t>
-              </a:r>
-              <a:r>
-                <a:rPr lang="en-IN" dirty="0" err="1" smtClean="0"/>
-                <a:t>ylist</a:t>
+                <a:t>mylist</a:t>
               </a:r>
               <a:r>
                 <a:rPr lang="en-IN" dirty="0" smtClean="0"/>
@@ -5180,11 +6289,7 @@
               <a:pPr algn="ctr"/>
               <a:r>
                 <a:rPr lang="en-IN" dirty="0" smtClean="0"/>
-                <a:t>c</a:t>
-              </a:r>
-              <a:r>
-                <a:rPr lang="en-IN" dirty="0" smtClean="0"/>
-                <a:t>urrent element = </a:t>
+                <a:t>current element = </a:t>
               </a:r>
               <a:r>
                 <a:rPr lang="en-IN" dirty="0" err="1" smtClean="0"/>
@@ -5242,11 +6347,7 @@
               <a:pPr algn="ctr"/>
               <a:r>
                 <a:rPr lang="en-IN" dirty="0" smtClean="0"/>
-                <a:t>m</a:t>
-              </a:r>
-              <a:r>
-                <a:rPr lang="en-IN" dirty="0" smtClean="0"/>
-                <a:t>in  = </a:t>
+                <a:t>min  = </a:t>
               </a:r>
               <a:r>
                 <a:rPr lang="en-IN" dirty="0" err="1" smtClean="0"/>
@@ -5292,11 +6393,7 @@
               <a:pPr algn="ctr"/>
               <a:r>
                 <a:rPr lang="en-IN" dirty="0" smtClean="0"/>
-                <a:t>m</a:t>
-              </a:r>
-              <a:r>
-                <a:rPr lang="en-IN" dirty="0" smtClean="0"/>
-                <a:t>in = min</a:t>
+                <a:t>min = min</a:t>
               </a:r>
               <a:endParaRPr lang="en-US" dirty="0"/>
             </a:p>
@@ -5338,11 +6435,7 @@
               <a:pPr algn="ctr"/>
               <a:r>
                 <a:rPr lang="en-IN" dirty="0" smtClean="0"/>
-                <a:t>i</a:t>
-              </a:r>
-              <a:r>
-                <a:rPr lang="en-IN" dirty="0" smtClean="0"/>
-                <a:t> =</a:t>
+                <a:t>i =</a:t>
               </a:r>
               <a:r>
                 <a:rPr lang="en-IN" dirty="0" err="1" smtClean="0"/>
@@ -5412,11 +6505,7 @@
               <a:pPr algn="ctr"/>
               <a:r>
                 <a:rPr lang="en-IN" dirty="0" smtClean="0"/>
-                <a:t>?</a:t>
-              </a:r>
-              <a:r>
-                <a:rPr lang="en-IN" dirty="0" smtClean="0"/>
-                <a:t> </a:t>
+                <a:t>? </a:t>
               </a:r>
               <a:endParaRPr lang="en-US" dirty="0"/>
             </a:p>
@@ -5458,11 +6547,7 @@
               <a:pPr algn="ctr"/>
               <a:r>
                 <a:rPr lang="en-IN" dirty="0" smtClean="0"/>
-                <a:t>p</a:t>
-              </a:r>
-              <a:r>
-                <a:rPr lang="en-IN" dirty="0" smtClean="0"/>
-                <a:t>rint minimum as min</a:t>
+                <a:t>print minimum as min</a:t>
               </a:r>
               <a:endParaRPr lang="en-US" dirty="0"/>
             </a:p>
@@ -6101,6 +7186,48 @@
           </p:txBody>
         </p:sp>
       </p:grpSp>
+      <p:sp>
+        <p:nvSpPr>
+          <p:cNvPr id="33" name="Rectangle 32"/>
+          <p:cNvSpPr/>
+          <p:nvPr/>
+        </p:nvSpPr>
+        <p:spPr>
+          <a:xfrm>
+            <a:off x="4286256" y="523844"/>
+            <a:ext cx="2286016" cy="714380"/>
+          </a:xfrm>
+          <a:prstGeom prst="rect">
+            <a:avLst/>
+          </a:prstGeom>
+        </p:spPr>
+        <p:style>
+          <a:lnRef idx="2">
+            <a:schemeClr val="accent6"/>
+          </a:lnRef>
+          <a:fillRef idx="1">
+            <a:schemeClr val="lt1"/>
+          </a:fillRef>
+          <a:effectRef idx="0">
+            <a:schemeClr val="accent6"/>
+          </a:effectRef>
+          <a:fontRef idx="minor">
+            <a:schemeClr val="dk1"/>
+          </a:fontRef>
+        </p:style>
+        <p:txBody>
+          <a:bodyPr rtlCol="0" anchor="ctr"/>
+          <a:lstStyle/>
+          <a:p>
+            <a:pPr algn="ctr"/>
+            <a:r>
+              <a:rPr lang="en-IN" dirty="0" smtClean="0"/>
+              <a:t>Finding Minimum in List</a:t>
+            </a:r>
+            <a:endParaRPr lang="en-US" dirty="0"/>
+          </a:p>
+        </p:txBody>
+      </p:sp>
     </p:spTree>
   </p:cSld>
   <p:clrMapOvr>

</xml_diff>

<commit_message>
Last Update 18-09-2018 17:31:04.38
</commit_message>
<xml_diff>
--- a/Slides/Unit 1/Flow-Charts.pptx
+++ b/Slides/Unit 1/Flow-Charts.pptx
@@ -9,6 +9,10 @@
     <p:sldId id="259" r:id="rId3"/>
     <p:sldId id="256" r:id="rId4"/>
     <p:sldId id="261" r:id="rId5"/>
+    <p:sldId id="263" r:id="rId6"/>
+    <p:sldId id="262" r:id="rId7"/>
+    <p:sldId id="264" r:id="rId8"/>
+    <p:sldId id="265" r:id="rId9"/>
   </p:sldIdLst>
   <p:sldSz cx="6858000" cy="9906000" type="A4"/>
   <p:notesSz cx="6858000" cy="9144000"/>
@@ -292,7 +296,7 @@
             <a:fld id="{A9953F39-409C-4934-84CB-8EF94422C604}" type="datetimeFigureOut">
               <a:rPr lang="en-US" smtClean="0"/>
               <a:pPr/>
-              <a:t>9/17/2018</a:t>
+              <a:t>9/18/2018</a:t>
             </a:fld>
             <a:endParaRPr lang="en-US"/>
           </a:p>
@@ -459,7 +463,7 @@
             <a:fld id="{A9953F39-409C-4934-84CB-8EF94422C604}" type="datetimeFigureOut">
               <a:rPr lang="en-US" smtClean="0"/>
               <a:pPr/>
-              <a:t>9/17/2018</a:t>
+              <a:t>9/18/2018</a:t>
             </a:fld>
             <a:endParaRPr lang="en-US"/>
           </a:p>
@@ -636,7 +640,7 @@
             <a:fld id="{A9953F39-409C-4934-84CB-8EF94422C604}" type="datetimeFigureOut">
               <a:rPr lang="en-US" smtClean="0"/>
               <a:pPr/>
-              <a:t>9/17/2018</a:t>
+              <a:t>9/18/2018</a:t>
             </a:fld>
             <a:endParaRPr lang="en-US"/>
           </a:p>
@@ -803,7 +807,7 @@
             <a:fld id="{A9953F39-409C-4934-84CB-8EF94422C604}" type="datetimeFigureOut">
               <a:rPr lang="en-US" smtClean="0"/>
               <a:pPr/>
-              <a:t>9/17/2018</a:t>
+              <a:t>9/18/2018</a:t>
             </a:fld>
             <a:endParaRPr lang="en-US"/>
           </a:p>
@@ -1046,7 +1050,7 @@
             <a:fld id="{A9953F39-409C-4934-84CB-8EF94422C604}" type="datetimeFigureOut">
               <a:rPr lang="en-US" smtClean="0"/>
               <a:pPr/>
-              <a:t>9/17/2018</a:t>
+              <a:t>9/18/2018</a:t>
             </a:fld>
             <a:endParaRPr lang="en-US"/>
           </a:p>
@@ -1331,7 +1335,7 @@
             <a:fld id="{A9953F39-409C-4934-84CB-8EF94422C604}" type="datetimeFigureOut">
               <a:rPr lang="en-US" smtClean="0"/>
               <a:pPr/>
-              <a:t>9/17/2018</a:t>
+              <a:t>9/18/2018</a:t>
             </a:fld>
             <a:endParaRPr lang="en-US"/>
           </a:p>
@@ -1750,7 +1754,7 @@
             <a:fld id="{A9953F39-409C-4934-84CB-8EF94422C604}" type="datetimeFigureOut">
               <a:rPr lang="en-US" smtClean="0"/>
               <a:pPr/>
-              <a:t>9/17/2018</a:t>
+              <a:t>9/18/2018</a:t>
             </a:fld>
             <a:endParaRPr lang="en-US"/>
           </a:p>
@@ -1865,7 +1869,7 @@
             <a:fld id="{A9953F39-409C-4934-84CB-8EF94422C604}" type="datetimeFigureOut">
               <a:rPr lang="en-US" smtClean="0"/>
               <a:pPr/>
-              <a:t>9/17/2018</a:t>
+              <a:t>9/18/2018</a:t>
             </a:fld>
             <a:endParaRPr lang="en-US"/>
           </a:p>
@@ -1957,7 +1961,7 @@
             <a:fld id="{A9953F39-409C-4934-84CB-8EF94422C604}" type="datetimeFigureOut">
               <a:rPr lang="en-US" smtClean="0"/>
               <a:pPr/>
-              <a:t>9/17/2018</a:t>
+              <a:t>9/18/2018</a:t>
             </a:fld>
             <a:endParaRPr lang="en-US"/>
           </a:p>
@@ -2231,7 +2235,7 @@
             <a:fld id="{A9953F39-409C-4934-84CB-8EF94422C604}" type="datetimeFigureOut">
               <a:rPr lang="en-US" smtClean="0"/>
               <a:pPr/>
-              <a:t>9/17/2018</a:t>
+              <a:t>9/18/2018</a:t>
             </a:fld>
             <a:endParaRPr lang="en-US"/>
           </a:p>
@@ -2481,7 +2485,7 @@
             <a:fld id="{A9953F39-409C-4934-84CB-8EF94422C604}" type="datetimeFigureOut">
               <a:rPr lang="en-US" smtClean="0"/>
               <a:pPr/>
-              <a:t>9/17/2018</a:t>
+              <a:t>9/18/2018</a:t>
             </a:fld>
             <a:endParaRPr lang="en-US"/>
           </a:p>
@@ -2691,7 +2695,7 @@
             <a:fld id="{A9953F39-409C-4934-84CB-8EF94422C604}" type="datetimeFigureOut">
               <a:rPr lang="en-US" smtClean="0"/>
               <a:pPr/>
-              <a:t>9/17/2018</a:t>
+              <a:t>9/18/2018</a:t>
             </a:fld>
             <a:endParaRPr lang="en-US"/>
           </a:p>
@@ -6085,7 +6089,7 @@
               <a:pPr algn="ctr"/>
               <a:r>
                 <a:rPr lang="en-IN" dirty="0" smtClean="0"/>
-                <a:t>min&gt;=</a:t>
+                <a:t>min&gt;</a:t>
               </a:r>
               <a:r>
                 <a:rPr lang="en-IN" dirty="0" err="1" smtClean="0"/>
@@ -6143,7 +6147,7 @@
               </a:r>
               <a:r>
                 <a:rPr lang="en-IN" dirty="0" smtClean="0"/>
-                <a:t> = [7,5,2,1,,8,9]</a:t>
+                <a:t> = [7,5,1,,2,3]</a:t>
               </a:r>
               <a:endParaRPr lang="en-US" dirty="0"/>
             </a:p>
@@ -6243,11 +6247,11 @@
               </a:r>
               <a:r>
                 <a:rPr lang="en-IN" dirty="0" err="1" smtClean="0"/>
-                <a:t>of_list</a:t>
+                <a:t>of_mylist</a:t>
               </a:r>
               <a:r>
                 <a:rPr lang="en-IN" dirty="0" smtClean="0"/>
-                <a:t>= 6</a:t>
+                <a:t>= 5</a:t>
               </a:r>
               <a:endParaRPr lang="en-US" dirty="0"/>
             </a:p>
@@ -7228,6 +7232,3507 @@
           </a:p>
         </p:txBody>
       </p:sp>
+    </p:spTree>
+  </p:cSld>
+  <p:clrMapOvr>
+    <a:masterClrMapping/>
+  </p:clrMapOvr>
+</p:sld>
+</file>
+
+<file path=ppt/slides/slide5.xml><?xml version="1.0" encoding="utf-8"?>
+<p:sld xmlns:a="http://schemas.openxmlformats.org/drawingml/2006/main" xmlns:r="http://schemas.openxmlformats.org/officeDocument/2006/relationships" xmlns:p="http://schemas.openxmlformats.org/presentationml/2006/main">
+  <p:cSld>
+    <p:spTree>
+      <p:nvGrpSpPr>
+        <p:cNvPr id="1" name=""/>
+        <p:cNvGrpSpPr/>
+        <p:nvPr/>
+      </p:nvGrpSpPr>
+      <p:grpSpPr>
+        <a:xfrm>
+          <a:off x="0" y="0"/>
+          <a:ext cx="0" cy="0"/>
+          <a:chOff x="0" y="0"/>
+          <a:chExt cx="0" cy="0"/>
+        </a:xfrm>
+      </p:grpSpPr>
+      <p:grpSp>
+        <p:nvGrpSpPr>
+          <p:cNvPr id="57" name="Group 56"/>
+          <p:cNvGrpSpPr/>
+          <p:nvPr/>
+        </p:nvGrpSpPr>
+        <p:grpSpPr>
+          <a:xfrm>
+            <a:off x="785794" y="809596"/>
+            <a:ext cx="5214974" cy="8715436"/>
+            <a:chOff x="785794" y="809596"/>
+            <a:chExt cx="5214974" cy="8715436"/>
+          </a:xfrm>
+        </p:grpSpPr>
+        <p:sp>
+          <p:nvSpPr>
+            <p:cNvPr id="2" name="Oval 1"/>
+            <p:cNvSpPr/>
+            <p:nvPr/>
+          </p:nvSpPr>
+          <p:spPr>
+            <a:xfrm>
+              <a:off x="1399653" y="809596"/>
+              <a:ext cx="1303334" cy="500066"/>
+            </a:xfrm>
+            <a:prstGeom prst="ellipse">
+              <a:avLst/>
+            </a:prstGeom>
+          </p:spPr>
+          <p:style>
+            <a:lnRef idx="2">
+              <a:schemeClr val="dk1"/>
+            </a:lnRef>
+            <a:fillRef idx="1">
+              <a:schemeClr val="lt1"/>
+            </a:fillRef>
+            <a:effectRef idx="0">
+              <a:schemeClr val="dk1"/>
+            </a:effectRef>
+            <a:fontRef idx="minor">
+              <a:schemeClr val="dk1"/>
+            </a:fontRef>
+          </p:style>
+          <p:txBody>
+            <a:bodyPr wrap="none" rtlCol="0" anchor="ctr"/>
+            <a:lstStyle/>
+            <a:p>
+              <a:pPr algn="ctr"/>
+              <a:r>
+                <a:rPr lang="en-IN" dirty="0" smtClean="0"/>
+                <a:t>start</a:t>
+              </a:r>
+              <a:endParaRPr lang="en-US" dirty="0"/>
+            </a:p>
+          </p:txBody>
+        </p:sp>
+        <p:sp>
+          <p:nvSpPr>
+            <p:cNvPr id="3" name="Flowchart: Data 2"/>
+            <p:cNvSpPr/>
+            <p:nvPr/>
+          </p:nvSpPr>
+          <p:spPr>
+            <a:xfrm>
+              <a:off x="1000108" y="2666984"/>
+              <a:ext cx="2112418" cy="500066"/>
+            </a:xfrm>
+            <a:prstGeom prst="flowChartInputOutput">
+              <a:avLst/>
+            </a:prstGeom>
+          </p:spPr>
+          <p:style>
+            <a:lnRef idx="2">
+              <a:schemeClr val="dk1"/>
+            </a:lnRef>
+            <a:fillRef idx="1">
+              <a:schemeClr val="lt1"/>
+            </a:fillRef>
+            <a:effectRef idx="0">
+              <a:schemeClr val="dk1"/>
+            </a:effectRef>
+            <a:fontRef idx="minor">
+              <a:schemeClr val="dk1"/>
+            </a:fontRef>
+          </p:style>
+          <p:txBody>
+            <a:bodyPr wrap="none" rtlCol="0" anchor="ctr"/>
+            <a:lstStyle/>
+            <a:p>
+              <a:pPr algn="ctr"/>
+              <a:r>
+                <a:rPr lang="en-IN" dirty="0" smtClean="0"/>
+                <a:t>read  </a:t>
+              </a:r>
+              <a:r>
+                <a:rPr lang="en-IN" dirty="0" smtClean="0"/>
+                <a:t>guess</a:t>
+              </a:r>
+              <a:endParaRPr lang="en-US" dirty="0"/>
+            </a:p>
+          </p:txBody>
+        </p:sp>
+        <p:sp>
+          <p:nvSpPr>
+            <p:cNvPr id="4" name="Flowchart: Decision 3"/>
+            <p:cNvSpPr/>
+            <p:nvPr/>
+          </p:nvSpPr>
+          <p:spPr>
+            <a:xfrm>
+              <a:off x="933667" y="3718144"/>
+              <a:ext cx="2245300" cy="928694"/>
+            </a:xfrm>
+            <a:prstGeom prst="flowChartDecision">
+              <a:avLst/>
+            </a:prstGeom>
+          </p:spPr>
+          <p:style>
+            <a:lnRef idx="2">
+              <a:schemeClr val="dk1"/>
+            </a:lnRef>
+            <a:fillRef idx="1">
+              <a:schemeClr val="lt1"/>
+            </a:fillRef>
+            <a:effectRef idx="0">
+              <a:schemeClr val="dk1"/>
+            </a:effectRef>
+            <a:fontRef idx="minor">
+              <a:schemeClr val="dk1"/>
+            </a:fontRef>
+          </p:style>
+          <p:txBody>
+            <a:bodyPr wrap="none" rtlCol="0" anchor="ctr"/>
+            <a:lstStyle/>
+            <a:p>
+              <a:pPr algn="ctr"/>
+              <a:endParaRPr lang="en-IN" dirty="0" smtClean="0"/>
+            </a:p>
+            <a:p>
+              <a:pPr algn="ctr"/>
+              <a:r>
+                <a:rPr lang="en-IN" dirty="0" smtClean="0"/>
+                <a:t>a</a:t>
+              </a:r>
+              <a:r>
+                <a:rPr lang="en-IN" dirty="0" smtClean="0"/>
+                <a:t>ctual = guess</a:t>
+              </a:r>
+            </a:p>
+            <a:p>
+              <a:pPr algn="ctr"/>
+              <a:r>
+                <a:rPr lang="en-IN" dirty="0" smtClean="0"/>
+                <a:t>?</a:t>
+              </a:r>
+              <a:endParaRPr lang="en-US" dirty="0"/>
+            </a:p>
+          </p:txBody>
+        </p:sp>
+        <p:sp>
+          <p:nvSpPr>
+            <p:cNvPr id="5" name="Rectangle 4"/>
+            <p:cNvSpPr/>
+            <p:nvPr/>
+          </p:nvSpPr>
+          <p:spPr>
+            <a:xfrm>
+              <a:off x="1000108" y="1666852"/>
+              <a:ext cx="2112418" cy="500066"/>
+            </a:xfrm>
+            <a:prstGeom prst="rect">
+              <a:avLst/>
+            </a:prstGeom>
+          </p:spPr>
+          <p:style>
+            <a:lnRef idx="2">
+              <a:schemeClr val="dk1"/>
+            </a:lnRef>
+            <a:fillRef idx="1">
+              <a:schemeClr val="lt1"/>
+            </a:fillRef>
+            <a:effectRef idx="0">
+              <a:schemeClr val="dk1"/>
+            </a:effectRef>
+            <a:fontRef idx="minor">
+              <a:schemeClr val="dk1"/>
+            </a:fontRef>
+          </p:style>
+          <p:txBody>
+            <a:bodyPr wrap="none" rtlCol="0" anchor="ctr"/>
+            <a:lstStyle/>
+            <a:p>
+              <a:pPr algn="ctr"/>
+              <a:r>
+                <a:rPr lang="en-IN" dirty="0" smtClean="0"/>
+                <a:t>a</a:t>
+              </a:r>
+              <a:r>
+                <a:rPr lang="en-IN" dirty="0" smtClean="0"/>
+                <a:t>ctual = 30</a:t>
+              </a:r>
+              <a:endParaRPr lang="en-US" dirty="0"/>
+            </a:p>
+          </p:txBody>
+        </p:sp>
+        <p:sp>
+          <p:nvSpPr>
+            <p:cNvPr id="6" name="Flowchart: Decision 5"/>
+            <p:cNvSpPr/>
+            <p:nvPr/>
+          </p:nvSpPr>
+          <p:spPr>
+            <a:xfrm>
+              <a:off x="928670" y="5116288"/>
+              <a:ext cx="2245300" cy="928694"/>
+            </a:xfrm>
+            <a:prstGeom prst="flowChartDecision">
+              <a:avLst/>
+            </a:prstGeom>
+          </p:spPr>
+          <p:style>
+            <a:lnRef idx="2">
+              <a:schemeClr val="dk1"/>
+            </a:lnRef>
+            <a:fillRef idx="1">
+              <a:schemeClr val="lt1"/>
+            </a:fillRef>
+            <a:effectRef idx="0">
+              <a:schemeClr val="dk1"/>
+            </a:effectRef>
+            <a:fontRef idx="minor">
+              <a:schemeClr val="dk1"/>
+            </a:fontRef>
+          </p:style>
+          <p:txBody>
+            <a:bodyPr wrap="none" rtlCol="0" anchor="ctr"/>
+            <a:lstStyle/>
+            <a:p>
+              <a:pPr algn="ctr"/>
+              <a:r>
+                <a:rPr lang="en-IN" dirty="0" smtClean="0"/>
+                <a:t>a</a:t>
+              </a:r>
+              <a:r>
+                <a:rPr lang="en-IN" dirty="0" smtClean="0"/>
+                <a:t>ctual &lt; guess</a:t>
+              </a:r>
+              <a:endParaRPr lang="en-US" dirty="0"/>
+            </a:p>
+          </p:txBody>
+        </p:sp>
+        <p:sp>
+          <p:nvSpPr>
+            <p:cNvPr id="7" name="Flowchart: Display 6"/>
+            <p:cNvSpPr/>
+            <p:nvPr/>
+          </p:nvSpPr>
+          <p:spPr>
+            <a:xfrm>
+              <a:off x="1066573" y="6514432"/>
+              <a:ext cx="1969494" cy="785818"/>
+            </a:xfrm>
+            <a:prstGeom prst="flowChartDisplay">
+              <a:avLst/>
+            </a:prstGeom>
+          </p:spPr>
+          <p:style>
+            <a:lnRef idx="2">
+              <a:schemeClr val="dk1"/>
+            </a:lnRef>
+            <a:fillRef idx="1">
+              <a:schemeClr val="lt1"/>
+            </a:fillRef>
+            <a:effectRef idx="0">
+              <a:schemeClr val="dk1"/>
+            </a:effectRef>
+            <a:fontRef idx="minor">
+              <a:schemeClr val="dk1"/>
+            </a:fontRef>
+          </p:style>
+          <p:txBody>
+            <a:bodyPr wrap="none" rtlCol="0" anchor="ctr"/>
+            <a:lstStyle/>
+            <a:p>
+              <a:pPr algn="ctr"/>
+              <a:r>
+                <a:rPr lang="en-IN" dirty="0" smtClean="0"/>
+                <a:t>   	Enter Smaller </a:t>
+              </a:r>
+            </a:p>
+            <a:p>
+              <a:pPr algn="ctr"/>
+              <a:r>
+                <a:rPr lang="en-IN" dirty="0" smtClean="0"/>
+                <a:t>	Number </a:t>
+              </a:r>
+              <a:endParaRPr lang="en-US" dirty="0"/>
+            </a:p>
+          </p:txBody>
+        </p:sp>
+        <p:sp>
+          <p:nvSpPr>
+            <p:cNvPr id="8" name="Flowchart: Display 7"/>
+            <p:cNvSpPr/>
+            <p:nvPr/>
+          </p:nvSpPr>
+          <p:spPr>
+            <a:xfrm>
+              <a:off x="4031274" y="6453198"/>
+              <a:ext cx="1969494" cy="785818"/>
+            </a:xfrm>
+            <a:prstGeom prst="flowChartDisplay">
+              <a:avLst/>
+            </a:prstGeom>
+          </p:spPr>
+          <p:style>
+            <a:lnRef idx="2">
+              <a:schemeClr val="dk1"/>
+            </a:lnRef>
+            <a:fillRef idx="1">
+              <a:schemeClr val="lt1"/>
+            </a:fillRef>
+            <a:effectRef idx="0">
+              <a:schemeClr val="dk1"/>
+            </a:effectRef>
+            <a:fontRef idx="minor">
+              <a:schemeClr val="dk1"/>
+            </a:fontRef>
+          </p:style>
+          <p:txBody>
+            <a:bodyPr wrap="none" rtlCol="0" anchor="ctr"/>
+            <a:lstStyle/>
+            <a:p>
+              <a:pPr algn="ctr"/>
+              <a:r>
+                <a:rPr lang="en-IN" dirty="0" smtClean="0"/>
+                <a:t>   	Enter Greater</a:t>
+              </a:r>
+            </a:p>
+            <a:p>
+              <a:pPr algn="ctr"/>
+              <a:r>
+                <a:rPr lang="en-IN" dirty="0" smtClean="0"/>
+                <a:t>	Number </a:t>
+              </a:r>
+              <a:endParaRPr lang="en-US" dirty="0"/>
+            </a:p>
+          </p:txBody>
+        </p:sp>
+        <p:sp>
+          <p:nvSpPr>
+            <p:cNvPr id="9" name="Oval 8"/>
+            <p:cNvSpPr/>
+            <p:nvPr/>
+          </p:nvSpPr>
+          <p:spPr>
+            <a:xfrm>
+              <a:off x="4799022" y="7953396"/>
+              <a:ext cx="428628" cy="428628"/>
+            </a:xfrm>
+            <a:prstGeom prst="ellipse">
+              <a:avLst/>
+            </a:prstGeom>
+          </p:spPr>
+          <p:style>
+            <a:lnRef idx="2">
+              <a:schemeClr val="dk1"/>
+            </a:lnRef>
+            <a:fillRef idx="1">
+              <a:schemeClr val="lt1"/>
+            </a:fillRef>
+            <a:effectRef idx="0">
+              <a:schemeClr val="dk1"/>
+            </a:effectRef>
+            <a:fontRef idx="minor">
+              <a:schemeClr val="dk1"/>
+            </a:fontRef>
+          </p:style>
+          <p:txBody>
+            <a:bodyPr wrap="none" rtlCol="0" anchor="ctr"/>
+            <a:lstStyle/>
+            <a:p>
+              <a:pPr algn="ctr"/>
+              <a:endParaRPr lang="en-US" dirty="0"/>
+            </a:p>
+          </p:txBody>
+        </p:sp>
+        <p:sp>
+          <p:nvSpPr>
+            <p:cNvPr id="10" name="Flowchart: Display 9"/>
+            <p:cNvSpPr/>
+            <p:nvPr/>
+          </p:nvSpPr>
+          <p:spPr>
+            <a:xfrm>
+              <a:off x="1066573" y="7769700"/>
+              <a:ext cx="1969494" cy="785818"/>
+            </a:xfrm>
+            <a:prstGeom prst="flowChartDisplay">
+              <a:avLst/>
+            </a:prstGeom>
+          </p:spPr>
+          <p:style>
+            <a:lnRef idx="2">
+              <a:schemeClr val="dk1"/>
+            </a:lnRef>
+            <a:fillRef idx="1">
+              <a:schemeClr val="lt1"/>
+            </a:fillRef>
+            <a:effectRef idx="0">
+              <a:schemeClr val="dk1"/>
+            </a:effectRef>
+            <a:fontRef idx="minor">
+              <a:schemeClr val="dk1"/>
+            </a:fontRef>
+          </p:style>
+          <p:txBody>
+            <a:bodyPr wrap="none" rtlCol="0" anchor="ctr"/>
+            <a:lstStyle/>
+            <a:p>
+              <a:pPr algn="ctr"/>
+              <a:r>
+                <a:rPr lang="en-IN" dirty="0" smtClean="0"/>
+                <a:t>Number Found</a:t>
+              </a:r>
+              <a:endParaRPr lang="en-US" dirty="0"/>
+            </a:p>
+          </p:txBody>
+        </p:sp>
+        <p:sp>
+          <p:nvSpPr>
+            <p:cNvPr id="11" name="Oval 10"/>
+            <p:cNvSpPr/>
+            <p:nvPr/>
+          </p:nvSpPr>
+          <p:spPr>
+            <a:xfrm>
+              <a:off x="1399653" y="9024966"/>
+              <a:ext cx="1303334" cy="500066"/>
+            </a:xfrm>
+            <a:prstGeom prst="ellipse">
+              <a:avLst/>
+            </a:prstGeom>
+          </p:spPr>
+          <p:style>
+            <a:lnRef idx="2">
+              <a:schemeClr val="dk1"/>
+            </a:lnRef>
+            <a:fillRef idx="1">
+              <a:schemeClr val="lt1"/>
+            </a:fillRef>
+            <a:effectRef idx="0">
+              <a:schemeClr val="dk1"/>
+            </a:effectRef>
+            <a:fontRef idx="minor">
+              <a:schemeClr val="dk1"/>
+            </a:fontRef>
+          </p:style>
+          <p:txBody>
+            <a:bodyPr wrap="none" rtlCol="0" anchor="ctr"/>
+            <a:lstStyle/>
+            <a:p>
+              <a:pPr algn="ctr"/>
+              <a:r>
+                <a:rPr lang="en-IN" dirty="0" smtClean="0"/>
+                <a:t>stop</a:t>
+              </a:r>
+              <a:endParaRPr lang="en-US" dirty="0"/>
+            </a:p>
+          </p:txBody>
+        </p:sp>
+        <p:cxnSp>
+          <p:nvCxnSpPr>
+            <p:cNvPr id="12" name="Straight Arrow Connector 11"/>
+            <p:cNvCxnSpPr>
+              <a:stCxn id="2" idx="4"/>
+              <a:endCxn id="5" idx="0"/>
+            </p:cNvCxnSpPr>
+            <p:nvPr/>
+          </p:nvCxnSpPr>
+          <p:spPr>
+            <a:xfrm rot="16200000" flipH="1">
+              <a:off x="1875223" y="1485758"/>
+              <a:ext cx="357190" cy="4997"/>
+            </a:xfrm>
+            <a:prstGeom prst="straightConnector1">
+              <a:avLst/>
+            </a:prstGeom>
+            <a:ln>
+              <a:tailEnd type="arrow"/>
+            </a:ln>
+          </p:spPr>
+          <p:style>
+            <a:lnRef idx="1">
+              <a:schemeClr val="dk1"/>
+            </a:lnRef>
+            <a:fillRef idx="0">
+              <a:schemeClr val="dk1"/>
+            </a:fillRef>
+            <a:effectRef idx="0">
+              <a:schemeClr val="dk1"/>
+            </a:effectRef>
+            <a:fontRef idx="minor">
+              <a:schemeClr val="tx1"/>
+            </a:fontRef>
+          </p:style>
+        </p:cxnSp>
+        <p:cxnSp>
+          <p:nvCxnSpPr>
+            <p:cNvPr id="15" name="Straight Arrow Connector 14"/>
+            <p:cNvCxnSpPr>
+              <a:stCxn id="5" idx="2"/>
+              <a:endCxn id="3" idx="1"/>
+            </p:cNvCxnSpPr>
+            <p:nvPr/>
+          </p:nvCxnSpPr>
+          <p:spPr>
+            <a:xfrm rot="5400000">
+              <a:off x="1806284" y="2416951"/>
+              <a:ext cx="500066" cy="1588"/>
+            </a:xfrm>
+            <a:prstGeom prst="straightConnector1">
+              <a:avLst/>
+            </a:prstGeom>
+            <a:ln>
+              <a:tailEnd type="arrow"/>
+            </a:ln>
+          </p:spPr>
+          <p:style>
+            <a:lnRef idx="1">
+              <a:schemeClr val="dk1"/>
+            </a:lnRef>
+            <a:fillRef idx="0">
+              <a:schemeClr val="dk1"/>
+            </a:fillRef>
+            <a:effectRef idx="0">
+              <a:schemeClr val="dk1"/>
+            </a:effectRef>
+            <a:fontRef idx="minor">
+              <a:schemeClr val="tx1"/>
+            </a:fontRef>
+          </p:style>
+        </p:cxnSp>
+        <p:cxnSp>
+          <p:nvCxnSpPr>
+            <p:cNvPr id="18" name="Straight Arrow Connector 17"/>
+            <p:cNvCxnSpPr>
+              <a:stCxn id="3" idx="4"/>
+              <a:endCxn id="4" idx="0"/>
+            </p:cNvCxnSpPr>
+            <p:nvPr/>
+          </p:nvCxnSpPr>
+          <p:spPr>
+            <a:xfrm rot="5400000">
+              <a:off x="1780770" y="3442597"/>
+              <a:ext cx="551094" cy="1588"/>
+            </a:xfrm>
+            <a:prstGeom prst="straightConnector1">
+              <a:avLst/>
+            </a:prstGeom>
+            <a:ln>
+              <a:tailEnd type="arrow"/>
+            </a:ln>
+          </p:spPr>
+          <p:style>
+            <a:lnRef idx="1">
+              <a:schemeClr val="dk1"/>
+            </a:lnRef>
+            <a:fillRef idx="0">
+              <a:schemeClr val="dk1"/>
+            </a:fillRef>
+            <a:effectRef idx="0">
+              <a:schemeClr val="dk1"/>
+            </a:effectRef>
+            <a:fontRef idx="minor">
+              <a:schemeClr val="tx1"/>
+            </a:fontRef>
+          </p:style>
+        </p:cxnSp>
+        <p:cxnSp>
+          <p:nvCxnSpPr>
+            <p:cNvPr id="21" name="Straight Arrow Connector 20"/>
+            <p:cNvCxnSpPr>
+              <a:stCxn id="4" idx="2"/>
+              <a:endCxn id="6" idx="0"/>
+            </p:cNvCxnSpPr>
+            <p:nvPr/>
+          </p:nvCxnSpPr>
+          <p:spPr>
+            <a:xfrm rot="5400000">
+              <a:off x="1819094" y="4879065"/>
+              <a:ext cx="469450" cy="4997"/>
+            </a:xfrm>
+            <a:prstGeom prst="straightConnector1">
+              <a:avLst/>
+            </a:prstGeom>
+            <a:ln>
+              <a:tailEnd type="arrow"/>
+            </a:ln>
+          </p:spPr>
+          <p:style>
+            <a:lnRef idx="1">
+              <a:schemeClr val="dk1"/>
+            </a:lnRef>
+            <a:fillRef idx="0">
+              <a:schemeClr val="dk1"/>
+            </a:fillRef>
+            <a:effectRef idx="0">
+              <a:schemeClr val="dk1"/>
+            </a:effectRef>
+            <a:fontRef idx="minor">
+              <a:schemeClr val="tx1"/>
+            </a:fontRef>
+          </p:style>
+        </p:cxnSp>
+        <p:cxnSp>
+          <p:nvCxnSpPr>
+            <p:cNvPr id="24" name="Straight Arrow Connector 23"/>
+            <p:cNvCxnSpPr>
+              <a:stCxn id="6" idx="2"/>
+              <a:endCxn id="7" idx="0"/>
+            </p:cNvCxnSpPr>
+            <p:nvPr/>
+          </p:nvCxnSpPr>
+          <p:spPr>
+            <a:xfrm rot="5400000">
+              <a:off x="1816595" y="6279707"/>
+              <a:ext cx="469450" cy="1588"/>
+            </a:xfrm>
+            <a:prstGeom prst="straightConnector1">
+              <a:avLst/>
+            </a:prstGeom>
+            <a:ln>
+              <a:tailEnd type="arrow"/>
+            </a:ln>
+          </p:spPr>
+          <p:style>
+            <a:lnRef idx="1">
+              <a:schemeClr val="dk1"/>
+            </a:lnRef>
+            <a:fillRef idx="0">
+              <a:schemeClr val="dk1"/>
+            </a:fillRef>
+            <a:effectRef idx="0">
+              <a:schemeClr val="dk1"/>
+            </a:effectRef>
+            <a:fontRef idx="minor">
+              <a:schemeClr val="tx1"/>
+            </a:fontRef>
+          </p:style>
+        </p:cxnSp>
+        <p:cxnSp>
+          <p:nvCxnSpPr>
+            <p:cNvPr id="27" name="Straight Arrow Connector 26"/>
+            <p:cNvCxnSpPr>
+              <a:stCxn id="10" idx="2"/>
+              <a:endCxn id="11" idx="0"/>
+            </p:cNvCxnSpPr>
+            <p:nvPr/>
+          </p:nvCxnSpPr>
+          <p:spPr>
+            <a:xfrm rot="5400000">
+              <a:off x="1816596" y="8790242"/>
+              <a:ext cx="469448" cy="1588"/>
+            </a:xfrm>
+            <a:prstGeom prst="straightConnector1">
+              <a:avLst/>
+            </a:prstGeom>
+            <a:ln>
+              <a:tailEnd type="arrow"/>
+            </a:ln>
+          </p:spPr>
+          <p:style>
+            <a:lnRef idx="1">
+              <a:schemeClr val="dk1"/>
+            </a:lnRef>
+            <a:fillRef idx="0">
+              <a:schemeClr val="dk1"/>
+            </a:fillRef>
+            <a:effectRef idx="0">
+              <a:schemeClr val="dk1"/>
+            </a:effectRef>
+            <a:fontRef idx="minor">
+              <a:schemeClr val="tx1"/>
+            </a:fontRef>
+          </p:style>
+        </p:cxnSp>
+        <p:cxnSp>
+          <p:nvCxnSpPr>
+            <p:cNvPr id="30" name="Straight Arrow Connector 29"/>
+            <p:cNvCxnSpPr>
+              <a:stCxn id="8" idx="2"/>
+              <a:endCxn id="9" idx="0"/>
+            </p:cNvCxnSpPr>
+            <p:nvPr/>
+          </p:nvCxnSpPr>
+          <p:spPr>
+            <a:xfrm rot="5400000">
+              <a:off x="4657489" y="7594864"/>
+              <a:ext cx="714380" cy="2685"/>
+            </a:xfrm>
+            <a:prstGeom prst="straightConnector1">
+              <a:avLst/>
+            </a:prstGeom>
+            <a:ln>
+              <a:tailEnd type="arrow"/>
+            </a:ln>
+          </p:spPr>
+          <p:style>
+            <a:lnRef idx="1">
+              <a:schemeClr val="dk1"/>
+            </a:lnRef>
+            <a:fillRef idx="0">
+              <a:schemeClr val="dk1"/>
+            </a:fillRef>
+            <a:effectRef idx="0">
+              <a:schemeClr val="dk1"/>
+            </a:effectRef>
+            <a:fontRef idx="minor">
+              <a:schemeClr val="tx1"/>
+            </a:fontRef>
+          </p:style>
+        </p:cxnSp>
+        <p:cxnSp>
+          <p:nvCxnSpPr>
+            <p:cNvPr id="33" name="Elbow Connector 77"/>
+            <p:cNvCxnSpPr>
+              <a:stCxn id="4" idx="1"/>
+              <a:endCxn id="10" idx="1"/>
+            </p:cNvCxnSpPr>
+            <p:nvPr/>
+          </p:nvCxnSpPr>
+          <p:spPr>
+            <a:xfrm rot="10800000" flipH="1" flipV="1">
+              <a:off x="933667" y="4182491"/>
+              <a:ext cx="132906" cy="3980118"/>
+            </a:xfrm>
+            <a:prstGeom prst="bentConnector3">
+              <a:avLst>
+                <a:gd name="adj1" fmla="val -172001"/>
+              </a:avLst>
+            </a:prstGeom>
+            <a:ln>
+              <a:tailEnd type="arrow"/>
+            </a:ln>
+          </p:spPr>
+          <p:style>
+            <a:lnRef idx="1">
+              <a:schemeClr val="dk1"/>
+            </a:lnRef>
+            <a:fillRef idx="0">
+              <a:schemeClr val="dk1"/>
+            </a:fillRef>
+            <a:effectRef idx="0">
+              <a:schemeClr val="dk1"/>
+            </a:effectRef>
+            <a:fontRef idx="minor">
+              <a:schemeClr val="tx1"/>
+            </a:fontRef>
+          </p:style>
+        </p:cxnSp>
+        <p:cxnSp>
+          <p:nvCxnSpPr>
+            <p:cNvPr id="36" name="Elbow Connector 77"/>
+            <p:cNvCxnSpPr>
+              <a:stCxn id="7" idx="3"/>
+              <a:endCxn id="9" idx="2"/>
+            </p:cNvCxnSpPr>
+            <p:nvPr/>
+          </p:nvCxnSpPr>
+          <p:spPr>
+            <a:xfrm>
+              <a:off x="3036067" y="6907341"/>
+              <a:ext cx="1762955" cy="1260369"/>
+            </a:xfrm>
+            <a:prstGeom prst="bentConnector3">
+              <a:avLst>
+                <a:gd name="adj1" fmla="val 50000"/>
+              </a:avLst>
+            </a:prstGeom>
+            <a:ln>
+              <a:tailEnd type="arrow"/>
+            </a:ln>
+          </p:spPr>
+          <p:style>
+            <a:lnRef idx="1">
+              <a:schemeClr val="dk1"/>
+            </a:lnRef>
+            <a:fillRef idx="0">
+              <a:schemeClr val="dk1"/>
+            </a:fillRef>
+            <a:effectRef idx="0">
+              <a:schemeClr val="dk1"/>
+            </a:effectRef>
+            <a:fontRef idx="minor">
+              <a:schemeClr val="tx1"/>
+            </a:fontRef>
+          </p:style>
+        </p:cxnSp>
+        <p:cxnSp>
+          <p:nvCxnSpPr>
+            <p:cNvPr id="44" name="Elbow Connector 77"/>
+            <p:cNvCxnSpPr>
+              <a:stCxn id="6" idx="3"/>
+              <a:endCxn id="8" idx="0"/>
+            </p:cNvCxnSpPr>
+            <p:nvPr/>
+          </p:nvCxnSpPr>
+          <p:spPr>
+            <a:xfrm>
+              <a:off x="3173970" y="5580635"/>
+              <a:ext cx="1842051" cy="872563"/>
+            </a:xfrm>
+            <a:prstGeom prst="bentConnector2">
+              <a:avLst/>
+            </a:prstGeom>
+            <a:ln>
+              <a:tailEnd type="arrow"/>
+            </a:ln>
+          </p:spPr>
+          <p:style>
+            <a:lnRef idx="1">
+              <a:schemeClr val="dk1"/>
+            </a:lnRef>
+            <a:fillRef idx="0">
+              <a:schemeClr val="dk1"/>
+            </a:fillRef>
+            <a:effectRef idx="0">
+              <a:schemeClr val="dk1"/>
+            </a:effectRef>
+            <a:fontRef idx="minor">
+              <a:schemeClr val="tx1"/>
+            </a:fontRef>
+          </p:style>
+        </p:cxnSp>
+        <p:cxnSp>
+          <p:nvCxnSpPr>
+            <p:cNvPr id="47" name="Elbow Connector 77"/>
+            <p:cNvCxnSpPr>
+              <a:stCxn id="9" idx="6"/>
+              <a:endCxn id="3" idx="5"/>
+            </p:cNvCxnSpPr>
+            <p:nvPr/>
+          </p:nvCxnSpPr>
+          <p:spPr>
+            <a:xfrm flipH="1" flipV="1">
+              <a:off x="2901284" y="2917017"/>
+              <a:ext cx="2326366" cy="5250693"/>
+            </a:xfrm>
+            <a:prstGeom prst="bentConnector3">
+              <a:avLst>
+                <a:gd name="adj1" fmla="val -42581"/>
+              </a:avLst>
+            </a:prstGeom>
+            <a:ln>
+              <a:tailEnd type="arrow"/>
+            </a:ln>
+          </p:spPr>
+          <p:style>
+            <a:lnRef idx="1">
+              <a:schemeClr val="dk1"/>
+            </a:lnRef>
+            <a:fillRef idx="0">
+              <a:schemeClr val="dk1"/>
+            </a:fillRef>
+            <a:effectRef idx="0">
+              <a:schemeClr val="dk1"/>
+            </a:effectRef>
+            <a:fontRef idx="minor">
+              <a:schemeClr val="tx1"/>
+            </a:fontRef>
+          </p:style>
+        </p:cxnSp>
+        <p:sp>
+          <p:nvSpPr>
+            <p:cNvPr id="52" name="TextBox 51"/>
+            <p:cNvSpPr txBox="1"/>
+            <p:nvPr/>
+          </p:nvSpPr>
+          <p:spPr>
+            <a:xfrm>
+              <a:off x="785794" y="4810124"/>
+              <a:ext cx="607218" cy="369332"/>
+            </a:xfrm>
+            <a:prstGeom prst="rect">
+              <a:avLst/>
+            </a:prstGeom>
+            <a:noFill/>
+          </p:spPr>
+          <p:txBody>
+            <a:bodyPr wrap="none" rtlCol="0">
+              <a:spAutoFit/>
+            </a:bodyPr>
+            <a:lstStyle/>
+            <a:p>
+              <a:r>
+                <a:rPr lang="en-IN" i="1" dirty="0" smtClean="0"/>
+                <a:t>True</a:t>
+              </a:r>
+              <a:endParaRPr lang="en-US" i="1" dirty="0"/>
+            </a:p>
+          </p:txBody>
+        </p:sp>
+        <p:sp>
+          <p:nvSpPr>
+            <p:cNvPr id="53" name="TextBox 52"/>
+            <p:cNvSpPr txBox="1"/>
+            <p:nvPr/>
+          </p:nvSpPr>
+          <p:spPr>
+            <a:xfrm>
+              <a:off x="2214554" y="4738686"/>
+              <a:ext cx="659219" cy="369332"/>
+            </a:xfrm>
+            <a:prstGeom prst="rect">
+              <a:avLst/>
+            </a:prstGeom>
+            <a:noFill/>
+          </p:spPr>
+          <p:txBody>
+            <a:bodyPr wrap="none" rtlCol="0">
+              <a:spAutoFit/>
+            </a:bodyPr>
+            <a:lstStyle/>
+            <a:p>
+              <a:r>
+                <a:rPr lang="en-IN" i="1" dirty="0" smtClean="0"/>
+                <a:t>False</a:t>
+              </a:r>
+              <a:endParaRPr lang="en-US" i="1" dirty="0"/>
+            </a:p>
+          </p:txBody>
+        </p:sp>
+        <p:sp>
+          <p:nvSpPr>
+            <p:cNvPr id="54" name="TextBox 53"/>
+            <p:cNvSpPr txBox="1"/>
+            <p:nvPr/>
+          </p:nvSpPr>
+          <p:spPr>
+            <a:xfrm>
+              <a:off x="3627037" y="5083734"/>
+              <a:ext cx="659219" cy="369332"/>
+            </a:xfrm>
+            <a:prstGeom prst="rect">
+              <a:avLst/>
+            </a:prstGeom>
+            <a:noFill/>
+          </p:spPr>
+          <p:txBody>
+            <a:bodyPr wrap="none" rtlCol="0">
+              <a:spAutoFit/>
+            </a:bodyPr>
+            <a:lstStyle/>
+            <a:p>
+              <a:r>
+                <a:rPr lang="en-IN" i="1" dirty="0" smtClean="0"/>
+                <a:t>False</a:t>
+              </a:r>
+              <a:endParaRPr lang="en-US" i="1" dirty="0"/>
+            </a:p>
+          </p:txBody>
+        </p:sp>
+        <p:sp>
+          <p:nvSpPr>
+            <p:cNvPr id="55" name="TextBox 54"/>
+            <p:cNvSpPr txBox="1"/>
+            <p:nvPr/>
+          </p:nvSpPr>
+          <p:spPr>
+            <a:xfrm>
+              <a:off x="2071678" y="6083866"/>
+              <a:ext cx="607218" cy="369332"/>
+            </a:xfrm>
+            <a:prstGeom prst="rect">
+              <a:avLst/>
+            </a:prstGeom>
+            <a:noFill/>
+          </p:spPr>
+          <p:txBody>
+            <a:bodyPr wrap="none" rtlCol="0">
+              <a:spAutoFit/>
+            </a:bodyPr>
+            <a:lstStyle/>
+            <a:p>
+              <a:r>
+                <a:rPr lang="en-IN" i="1" dirty="0" smtClean="0"/>
+                <a:t>True</a:t>
+              </a:r>
+              <a:endParaRPr lang="en-US" i="1" dirty="0"/>
+            </a:p>
+          </p:txBody>
+        </p:sp>
+      </p:grpSp>
+      <p:sp>
+        <p:nvSpPr>
+          <p:cNvPr id="56" name="Rectangle 55"/>
+          <p:cNvSpPr/>
+          <p:nvPr/>
+        </p:nvSpPr>
+        <p:spPr>
+          <a:xfrm>
+            <a:off x="4286256" y="523844"/>
+            <a:ext cx="2286016" cy="714380"/>
+          </a:xfrm>
+          <a:prstGeom prst="rect">
+            <a:avLst/>
+          </a:prstGeom>
+        </p:spPr>
+        <p:style>
+          <a:lnRef idx="2">
+            <a:schemeClr val="accent6"/>
+          </a:lnRef>
+          <a:fillRef idx="1">
+            <a:schemeClr val="lt1"/>
+          </a:fillRef>
+          <a:effectRef idx="0">
+            <a:schemeClr val="accent6"/>
+          </a:effectRef>
+          <a:fontRef idx="minor">
+            <a:schemeClr val="dk1"/>
+          </a:fontRef>
+        </p:style>
+        <p:txBody>
+          <a:bodyPr rtlCol="0" anchor="ctr"/>
+          <a:lstStyle/>
+          <a:p>
+            <a:pPr algn="ctr"/>
+            <a:r>
+              <a:rPr lang="en-IN" dirty="0" smtClean="0"/>
+              <a:t>Guess a Integer Number</a:t>
+            </a:r>
+            <a:endParaRPr lang="en-US" dirty="0"/>
+          </a:p>
+        </p:txBody>
+      </p:sp>
+    </p:spTree>
+  </p:cSld>
+  <p:clrMapOvr>
+    <a:masterClrMapping/>
+  </p:clrMapOvr>
+</p:sld>
+</file>
+
+<file path=ppt/slides/slide6.xml><?xml version="1.0" encoding="utf-8"?>
+<p:sld xmlns:a="http://schemas.openxmlformats.org/drawingml/2006/main" xmlns:r="http://schemas.openxmlformats.org/officeDocument/2006/relationships" xmlns:p="http://schemas.openxmlformats.org/presentationml/2006/main">
+  <p:cSld>
+    <p:spTree>
+      <p:nvGrpSpPr>
+        <p:cNvPr id="1" name=""/>
+        <p:cNvGrpSpPr/>
+        <p:nvPr/>
+      </p:nvGrpSpPr>
+      <p:grpSpPr>
+        <a:xfrm>
+          <a:off x="0" y="0"/>
+          <a:ext cx="0" cy="0"/>
+          <a:chOff x="0" y="0"/>
+          <a:chExt cx="0" cy="0"/>
+        </a:xfrm>
+      </p:grpSpPr>
+      <p:sp>
+        <p:nvSpPr>
+          <p:cNvPr id="2" name="Oval 1"/>
+          <p:cNvSpPr/>
+          <p:nvPr/>
+        </p:nvSpPr>
+        <p:spPr>
+          <a:xfrm>
+            <a:off x="2292652" y="809596"/>
+            <a:ext cx="1303334" cy="500066"/>
+          </a:xfrm>
+          <a:prstGeom prst="ellipse">
+            <a:avLst/>
+          </a:prstGeom>
+        </p:spPr>
+        <p:style>
+          <a:lnRef idx="2">
+            <a:schemeClr val="dk1"/>
+          </a:lnRef>
+          <a:fillRef idx="1">
+            <a:schemeClr val="lt1"/>
+          </a:fillRef>
+          <a:effectRef idx="0">
+            <a:schemeClr val="dk1"/>
+          </a:effectRef>
+          <a:fontRef idx="minor">
+            <a:schemeClr val="dk1"/>
+          </a:fontRef>
+        </p:style>
+        <p:txBody>
+          <a:bodyPr wrap="none" rtlCol="0" anchor="ctr"/>
+          <a:lstStyle/>
+          <a:p>
+            <a:pPr algn="ctr"/>
+            <a:endParaRPr lang="en-US" dirty="0"/>
+          </a:p>
+        </p:txBody>
+      </p:sp>
+      <p:sp>
+        <p:nvSpPr>
+          <p:cNvPr id="3" name="Flowchart: Data 2"/>
+          <p:cNvSpPr/>
+          <p:nvPr/>
+        </p:nvSpPr>
+        <p:spPr>
+          <a:xfrm>
+            <a:off x="1888110" y="1648992"/>
+            <a:ext cx="2112418" cy="500066"/>
+          </a:xfrm>
+          <a:prstGeom prst="flowChartInputOutput">
+            <a:avLst/>
+          </a:prstGeom>
+        </p:spPr>
+        <p:style>
+          <a:lnRef idx="2">
+            <a:schemeClr val="dk1"/>
+          </a:lnRef>
+          <a:fillRef idx="1">
+            <a:schemeClr val="lt1"/>
+          </a:fillRef>
+          <a:effectRef idx="0">
+            <a:schemeClr val="dk1"/>
+          </a:effectRef>
+          <a:fontRef idx="minor">
+            <a:schemeClr val="dk1"/>
+          </a:fontRef>
+        </p:style>
+        <p:txBody>
+          <a:bodyPr wrap="none" rtlCol="0" anchor="ctr"/>
+          <a:lstStyle/>
+          <a:p>
+            <a:pPr algn="ctr"/>
+            <a:endParaRPr lang="en-US" dirty="0"/>
+          </a:p>
+        </p:txBody>
+      </p:sp>
+      <p:sp>
+        <p:nvSpPr>
+          <p:cNvPr id="4" name="Flowchart: Decision 3"/>
+          <p:cNvSpPr/>
+          <p:nvPr/>
+        </p:nvSpPr>
+        <p:spPr>
+          <a:xfrm>
+            <a:off x="2066705" y="2381232"/>
+            <a:ext cx="1755228" cy="1000132"/>
+          </a:xfrm>
+          <a:prstGeom prst="flowChartDecision">
+            <a:avLst/>
+          </a:prstGeom>
+        </p:spPr>
+        <p:style>
+          <a:lnRef idx="2">
+            <a:schemeClr val="dk1"/>
+          </a:lnRef>
+          <a:fillRef idx="1">
+            <a:schemeClr val="lt1"/>
+          </a:fillRef>
+          <a:effectRef idx="0">
+            <a:schemeClr val="dk1"/>
+          </a:effectRef>
+          <a:fontRef idx="minor">
+            <a:schemeClr val="dk1"/>
+          </a:fontRef>
+        </p:style>
+        <p:txBody>
+          <a:bodyPr wrap="none" rtlCol="0" anchor="ctr"/>
+          <a:lstStyle/>
+          <a:p>
+            <a:pPr algn="ctr"/>
+            <a:endParaRPr lang="en-US" dirty="0"/>
+          </a:p>
+        </p:txBody>
+      </p:sp>
+      <p:sp>
+        <p:nvSpPr>
+          <p:cNvPr id="5" name="Flowchart: Display 4"/>
+          <p:cNvSpPr/>
+          <p:nvPr/>
+        </p:nvSpPr>
+        <p:spPr>
+          <a:xfrm>
+            <a:off x="2143116" y="3738554"/>
+            <a:ext cx="1969494" cy="642942"/>
+          </a:xfrm>
+          <a:prstGeom prst="flowChartDisplay">
+            <a:avLst/>
+          </a:prstGeom>
+        </p:spPr>
+        <p:style>
+          <a:lnRef idx="2">
+            <a:schemeClr val="dk1"/>
+          </a:lnRef>
+          <a:fillRef idx="1">
+            <a:schemeClr val="lt1"/>
+          </a:fillRef>
+          <a:effectRef idx="0">
+            <a:schemeClr val="dk1"/>
+          </a:effectRef>
+          <a:fontRef idx="minor">
+            <a:schemeClr val="dk1"/>
+          </a:fontRef>
+        </p:style>
+        <p:txBody>
+          <a:bodyPr wrap="none" rtlCol="0" anchor="ctr"/>
+          <a:lstStyle/>
+          <a:p>
+            <a:pPr algn="ctr"/>
+            <a:endParaRPr lang="en-US" dirty="0"/>
+          </a:p>
+        </p:txBody>
+      </p:sp>
+      <p:cxnSp>
+        <p:nvCxnSpPr>
+          <p:cNvPr id="6" name="Straight Arrow Connector 5"/>
+          <p:cNvCxnSpPr/>
+          <p:nvPr/>
+        </p:nvCxnSpPr>
+        <p:spPr>
+          <a:xfrm rot="5400000">
+            <a:off x="896281" y="5985521"/>
+            <a:ext cx="357190" cy="6660"/>
+          </a:xfrm>
+          <a:prstGeom prst="straightConnector1">
+            <a:avLst/>
+          </a:prstGeom>
+          <a:ln>
+            <a:tailEnd type="arrow"/>
+          </a:ln>
+        </p:spPr>
+        <p:style>
+          <a:lnRef idx="1">
+            <a:schemeClr val="dk1"/>
+          </a:lnRef>
+          <a:fillRef idx="0">
+            <a:schemeClr val="dk1"/>
+          </a:fillRef>
+          <a:effectRef idx="0">
+            <a:schemeClr val="dk1"/>
+          </a:effectRef>
+          <a:fontRef idx="minor">
+            <a:schemeClr val="tx1"/>
+          </a:fontRef>
+        </p:style>
+      </p:cxnSp>
+      <p:cxnSp>
+        <p:nvCxnSpPr>
+          <p:cNvPr id="7" name="Elbow Connector 77"/>
+          <p:cNvCxnSpPr/>
+          <p:nvPr/>
+        </p:nvCxnSpPr>
+        <p:spPr>
+          <a:xfrm>
+            <a:off x="1785926" y="5810256"/>
+            <a:ext cx="1571636" cy="1071570"/>
+          </a:xfrm>
+          <a:prstGeom prst="bentConnector3">
+            <a:avLst>
+              <a:gd name="adj1" fmla="val 50000"/>
+            </a:avLst>
+          </a:prstGeom>
+          <a:ln>
+            <a:tailEnd type="arrow"/>
+          </a:ln>
+        </p:spPr>
+        <p:style>
+          <a:lnRef idx="1">
+            <a:schemeClr val="dk1"/>
+          </a:lnRef>
+          <a:fillRef idx="0">
+            <a:schemeClr val="dk1"/>
+          </a:fillRef>
+          <a:effectRef idx="0">
+            <a:schemeClr val="dk1"/>
+          </a:effectRef>
+          <a:fontRef idx="minor">
+            <a:schemeClr val="tx1"/>
+          </a:fontRef>
+        </p:style>
+      </p:cxnSp>
+      <p:sp>
+        <p:nvSpPr>
+          <p:cNvPr id="8" name="Oval 7"/>
+          <p:cNvSpPr/>
+          <p:nvPr/>
+        </p:nvSpPr>
+        <p:spPr>
+          <a:xfrm>
+            <a:off x="4357694" y="6024570"/>
+            <a:ext cx="428628" cy="428628"/>
+          </a:xfrm>
+          <a:prstGeom prst="ellipse">
+            <a:avLst/>
+          </a:prstGeom>
+        </p:spPr>
+        <p:style>
+          <a:lnRef idx="2">
+            <a:schemeClr val="dk1"/>
+          </a:lnRef>
+          <a:fillRef idx="1">
+            <a:schemeClr val="lt1"/>
+          </a:fillRef>
+          <a:effectRef idx="0">
+            <a:schemeClr val="dk1"/>
+          </a:effectRef>
+          <a:fontRef idx="minor">
+            <a:schemeClr val="dk1"/>
+          </a:fontRef>
+        </p:style>
+        <p:txBody>
+          <a:bodyPr wrap="none" rtlCol="0" anchor="ctr"/>
+          <a:lstStyle/>
+          <a:p>
+            <a:pPr algn="ctr"/>
+            <a:endParaRPr lang="en-US" dirty="0"/>
+          </a:p>
+        </p:txBody>
+      </p:sp>
+      <p:sp>
+        <p:nvSpPr>
+          <p:cNvPr id="10" name="Rectangle 9"/>
+          <p:cNvSpPr/>
+          <p:nvPr/>
+        </p:nvSpPr>
+        <p:spPr>
+          <a:xfrm>
+            <a:off x="2214554" y="4881562"/>
+            <a:ext cx="2112418" cy="500066"/>
+          </a:xfrm>
+          <a:prstGeom prst="rect">
+            <a:avLst/>
+          </a:prstGeom>
+        </p:spPr>
+        <p:style>
+          <a:lnRef idx="2">
+            <a:schemeClr val="dk1"/>
+          </a:lnRef>
+          <a:fillRef idx="1">
+            <a:schemeClr val="lt1"/>
+          </a:fillRef>
+          <a:effectRef idx="0">
+            <a:schemeClr val="dk1"/>
+          </a:effectRef>
+          <a:fontRef idx="minor">
+            <a:schemeClr val="dk1"/>
+          </a:fontRef>
+        </p:style>
+        <p:txBody>
+          <a:bodyPr wrap="none" rtlCol="0" anchor="ctr"/>
+          <a:lstStyle/>
+          <a:p>
+            <a:pPr algn="ctr"/>
+            <a:endParaRPr lang="en-US" dirty="0"/>
+          </a:p>
+        </p:txBody>
+      </p:sp>
+    </p:spTree>
+  </p:cSld>
+  <p:clrMapOvr>
+    <a:masterClrMapping/>
+  </p:clrMapOvr>
+</p:sld>
+</file>
+
+<file path=ppt/slides/slide7.xml><?xml version="1.0" encoding="utf-8"?>
+<p:sld xmlns:a="http://schemas.openxmlformats.org/drawingml/2006/main" xmlns:r="http://schemas.openxmlformats.org/officeDocument/2006/relationships" xmlns:p="http://schemas.openxmlformats.org/presentationml/2006/main">
+  <p:cSld>
+    <p:spTree>
+      <p:nvGrpSpPr>
+        <p:cNvPr id="1" name=""/>
+        <p:cNvGrpSpPr/>
+        <p:nvPr/>
+      </p:nvGrpSpPr>
+      <p:grpSpPr>
+        <a:xfrm>
+          <a:off x="0" y="0"/>
+          <a:ext cx="0" cy="0"/>
+          <a:chOff x="0" y="0"/>
+          <a:chExt cx="0" cy="0"/>
+        </a:xfrm>
+      </p:grpSpPr>
+      <p:sp>
+        <p:nvSpPr>
+          <p:cNvPr id="2" name="Oval 1"/>
+          <p:cNvSpPr/>
+          <p:nvPr/>
+        </p:nvSpPr>
+        <p:spPr>
+          <a:xfrm>
+            <a:off x="1812920" y="738158"/>
+            <a:ext cx="1303334" cy="500066"/>
+          </a:xfrm>
+          <a:prstGeom prst="ellipse">
+            <a:avLst/>
+          </a:prstGeom>
+        </p:spPr>
+        <p:style>
+          <a:lnRef idx="2">
+            <a:schemeClr val="dk1"/>
+          </a:lnRef>
+          <a:fillRef idx="1">
+            <a:schemeClr val="lt1"/>
+          </a:fillRef>
+          <a:effectRef idx="0">
+            <a:schemeClr val="dk1"/>
+          </a:effectRef>
+          <a:fontRef idx="minor">
+            <a:schemeClr val="dk1"/>
+          </a:fontRef>
+        </p:style>
+        <p:txBody>
+          <a:bodyPr wrap="none" rtlCol="0" anchor="ctr"/>
+          <a:lstStyle/>
+          <a:p>
+            <a:pPr algn="ctr"/>
+            <a:r>
+              <a:rPr lang="en-IN" dirty="0" smtClean="0"/>
+              <a:t>start</a:t>
+            </a:r>
+            <a:endParaRPr lang="en-US" dirty="0"/>
+          </a:p>
+        </p:txBody>
+      </p:sp>
+      <p:sp>
+        <p:nvSpPr>
+          <p:cNvPr id="3" name="Rectangle 2"/>
+          <p:cNvSpPr/>
+          <p:nvPr/>
+        </p:nvSpPr>
+        <p:spPr>
+          <a:xfrm>
+            <a:off x="1178703" y="1523976"/>
+            <a:ext cx="2571768" cy="642942"/>
+          </a:xfrm>
+          <a:prstGeom prst="rect">
+            <a:avLst/>
+          </a:prstGeom>
+        </p:spPr>
+        <p:style>
+          <a:lnRef idx="2">
+            <a:schemeClr val="dk1"/>
+          </a:lnRef>
+          <a:fillRef idx="1">
+            <a:schemeClr val="lt1"/>
+          </a:fillRef>
+          <a:effectRef idx="0">
+            <a:schemeClr val="dk1"/>
+          </a:effectRef>
+          <a:fontRef idx="minor">
+            <a:schemeClr val="dk1"/>
+          </a:fontRef>
+        </p:style>
+        <p:txBody>
+          <a:bodyPr wrap="none" rtlCol="0" anchor="ctr"/>
+          <a:lstStyle/>
+          <a:p>
+            <a:pPr algn="ctr"/>
+            <a:r>
+              <a:rPr lang="en-IN" dirty="0" err="1" smtClean="0"/>
+              <a:t>my_cards</a:t>
+            </a:r>
+            <a:r>
+              <a:rPr lang="en-IN" dirty="0" smtClean="0"/>
+              <a:t> = [</a:t>
+            </a:r>
+            <a:r>
+              <a:rPr lang="en-IN" dirty="0" smtClean="0"/>
+              <a:t>4,5,7,8,9</a:t>
+            </a:r>
+            <a:r>
+              <a:rPr lang="en-IN" dirty="0" smtClean="0"/>
+              <a:t>]</a:t>
+            </a:r>
+          </a:p>
+          <a:p>
+            <a:pPr algn="ctr"/>
+            <a:r>
+              <a:rPr lang="en-IN" dirty="0" err="1" smtClean="0"/>
+              <a:t>length_of_my_cards</a:t>
+            </a:r>
+            <a:r>
+              <a:rPr lang="en-IN" dirty="0" smtClean="0"/>
+              <a:t> = </a:t>
+            </a:r>
+            <a:r>
+              <a:rPr lang="en-IN" dirty="0" smtClean="0"/>
+              <a:t>5</a:t>
+            </a:r>
+            <a:endParaRPr lang="en-US" dirty="0" smtClean="0"/>
+          </a:p>
+        </p:txBody>
+      </p:sp>
+      <p:sp>
+        <p:nvSpPr>
+          <p:cNvPr id="5" name="Rectangle 4"/>
+          <p:cNvSpPr/>
+          <p:nvPr/>
+        </p:nvSpPr>
+        <p:spPr>
+          <a:xfrm>
+            <a:off x="928670" y="2452670"/>
+            <a:ext cx="3071834" cy="500066"/>
+          </a:xfrm>
+          <a:prstGeom prst="rect">
+            <a:avLst/>
+          </a:prstGeom>
+        </p:spPr>
+        <p:style>
+          <a:lnRef idx="2">
+            <a:schemeClr val="dk1"/>
+          </a:lnRef>
+          <a:fillRef idx="1">
+            <a:schemeClr val="lt1"/>
+          </a:fillRef>
+          <a:effectRef idx="0">
+            <a:schemeClr val="dk1"/>
+          </a:effectRef>
+          <a:fontRef idx="minor">
+            <a:schemeClr val="dk1"/>
+          </a:fontRef>
+        </p:style>
+        <p:txBody>
+          <a:bodyPr wrap="none" rtlCol="0" anchor="ctr"/>
+          <a:lstStyle/>
+          <a:p>
+            <a:pPr algn="ctr"/>
+            <a:r>
+              <a:rPr lang="en-IN" dirty="0" err="1" smtClean="0"/>
+              <a:t>i</a:t>
+            </a:r>
+            <a:r>
+              <a:rPr lang="en-IN" dirty="0" err="1" smtClean="0"/>
+              <a:t>n_card</a:t>
+            </a:r>
+            <a:r>
+              <a:rPr lang="en-IN" dirty="0" smtClean="0"/>
+              <a:t> = 6, flag = 0, </a:t>
+            </a:r>
+            <a:r>
+              <a:rPr lang="en-IN" dirty="0" err="1" smtClean="0"/>
+              <a:t>i</a:t>
+            </a:r>
+            <a:r>
+              <a:rPr lang="en-IN" dirty="0" smtClean="0"/>
+              <a:t>=0, j = 0</a:t>
+            </a:r>
+            <a:endParaRPr lang="en-US" dirty="0"/>
+          </a:p>
+        </p:txBody>
+      </p:sp>
+      <p:sp>
+        <p:nvSpPr>
+          <p:cNvPr id="6" name="Rectangle 5"/>
+          <p:cNvSpPr/>
+          <p:nvPr/>
+        </p:nvSpPr>
+        <p:spPr>
+          <a:xfrm>
+            <a:off x="1071546" y="3167050"/>
+            <a:ext cx="2786082" cy="500066"/>
+          </a:xfrm>
+          <a:prstGeom prst="rect">
+            <a:avLst/>
+          </a:prstGeom>
+        </p:spPr>
+        <p:style>
+          <a:lnRef idx="2">
+            <a:schemeClr val="dk1"/>
+          </a:lnRef>
+          <a:fillRef idx="1">
+            <a:schemeClr val="lt1"/>
+          </a:fillRef>
+          <a:effectRef idx="0">
+            <a:schemeClr val="dk1"/>
+          </a:effectRef>
+          <a:fontRef idx="minor">
+            <a:schemeClr val="dk1"/>
+          </a:fontRef>
+        </p:style>
+        <p:txBody>
+          <a:bodyPr wrap="none" rtlCol="0" anchor="ctr"/>
+          <a:lstStyle/>
+          <a:p>
+            <a:pPr algn="ctr"/>
+            <a:r>
+              <a:rPr lang="en-IN" dirty="0" err="1" smtClean="0"/>
+              <a:t>temp</a:t>
+            </a:r>
+            <a:r>
+              <a:rPr lang="en-IN" dirty="0" err="1" smtClean="0"/>
+              <a:t>_cards</a:t>
+            </a:r>
+            <a:r>
+              <a:rPr lang="en-IN" dirty="0" smtClean="0"/>
+              <a:t> = [0,0,0,0,0,0] </a:t>
+            </a:r>
+            <a:endParaRPr lang="en-US" dirty="0"/>
+          </a:p>
+        </p:txBody>
+      </p:sp>
+      <p:sp>
+        <p:nvSpPr>
+          <p:cNvPr id="7" name="Flowchart: Display 6"/>
+          <p:cNvSpPr/>
+          <p:nvPr/>
+        </p:nvSpPr>
+        <p:spPr>
+          <a:xfrm>
+            <a:off x="1734822" y="3952868"/>
+            <a:ext cx="1459530" cy="500066"/>
+          </a:xfrm>
+          <a:prstGeom prst="flowChartDisplay">
+            <a:avLst/>
+          </a:prstGeom>
+        </p:spPr>
+        <p:style>
+          <a:lnRef idx="2">
+            <a:schemeClr val="dk1"/>
+          </a:lnRef>
+          <a:fillRef idx="1">
+            <a:schemeClr val="lt1"/>
+          </a:fillRef>
+          <a:effectRef idx="0">
+            <a:schemeClr val="dk1"/>
+          </a:effectRef>
+          <a:fontRef idx="minor">
+            <a:schemeClr val="dk1"/>
+          </a:fontRef>
+        </p:style>
+        <p:txBody>
+          <a:bodyPr wrap="none" rtlCol="0" anchor="ctr"/>
+          <a:lstStyle/>
+          <a:p>
+            <a:pPr algn="ctr"/>
+            <a:r>
+              <a:rPr lang="en-IN" dirty="0" err="1" smtClean="0"/>
+              <a:t>m</a:t>
+            </a:r>
+            <a:r>
+              <a:rPr lang="en-IN" dirty="0" err="1" smtClean="0"/>
+              <a:t>y_cards</a:t>
+            </a:r>
+            <a:endParaRPr lang="en-US" dirty="0"/>
+          </a:p>
+        </p:txBody>
+      </p:sp>
+      <p:sp>
+        <p:nvSpPr>
+          <p:cNvPr id="8" name="Rectangle 7"/>
+          <p:cNvSpPr/>
+          <p:nvPr/>
+        </p:nvSpPr>
+        <p:spPr>
+          <a:xfrm>
+            <a:off x="1071546" y="4738686"/>
+            <a:ext cx="2786082" cy="500066"/>
+          </a:xfrm>
+          <a:prstGeom prst="rect">
+            <a:avLst/>
+          </a:prstGeom>
+        </p:spPr>
+        <p:style>
+          <a:lnRef idx="2">
+            <a:schemeClr val="dk1"/>
+          </a:lnRef>
+          <a:fillRef idx="1">
+            <a:schemeClr val="lt1"/>
+          </a:fillRef>
+          <a:effectRef idx="0">
+            <a:schemeClr val="dk1"/>
+          </a:effectRef>
+          <a:fontRef idx="minor">
+            <a:schemeClr val="dk1"/>
+          </a:fontRef>
+        </p:style>
+        <p:txBody>
+          <a:bodyPr wrap="none" rtlCol="0" anchor="ctr"/>
+          <a:lstStyle/>
+          <a:p>
+            <a:pPr algn="ctr"/>
+            <a:r>
+              <a:rPr lang="en-IN" dirty="0" err="1" smtClean="0"/>
+              <a:t>cur_card</a:t>
+            </a:r>
+            <a:r>
+              <a:rPr lang="en-IN" dirty="0" smtClean="0"/>
+              <a:t> = </a:t>
+            </a:r>
+            <a:r>
+              <a:rPr lang="en-IN" dirty="0" err="1" smtClean="0"/>
+              <a:t>my_cards</a:t>
+            </a:r>
+            <a:r>
+              <a:rPr lang="en-IN" dirty="0" smtClean="0"/>
+              <a:t>[</a:t>
+            </a:r>
+            <a:r>
+              <a:rPr lang="en-IN" dirty="0" err="1" smtClean="0"/>
+              <a:t>i</a:t>
+            </a:r>
+            <a:r>
+              <a:rPr lang="en-IN" dirty="0" smtClean="0"/>
+              <a:t>]</a:t>
+            </a:r>
+            <a:endParaRPr lang="en-US" dirty="0"/>
+          </a:p>
+        </p:txBody>
+      </p:sp>
+      <p:sp>
+        <p:nvSpPr>
+          <p:cNvPr id="9" name="Flowchart: Decision 8"/>
+          <p:cNvSpPr/>
+          <p:nvPr/>
+        </p:nvSpPr>
+        <p:spPr>
+          <a:xfrm>
+            <a:off x="1142984" y="5524504"/>
+            <a:ext cx="2643206" cy="1143008"/>
+          </a:xfrm>
+          <a:prstGeom prst="flowChartDecision">
+            <a:avLst/>
+          </a:prstGeom>
+        </p:spPr>
+        <p:style>
+          <a:lnRef idx="2">
+            <a:schemeClr val="dk1"/>
+          </a:lnRef>
+          <a:fillRef idx="1">
+            <a:schemeClr val="lt1"/>
+          </a:fillRef>
+          <a:effectRef idx="0">
+            <a:schemeClr val="dk1"/>
+          </a:effectRef>
+          <a:fontRef idx="minor">
+            <a:schemeClr val="dk1"/>
+          </a:fontRef>
+        </p:style>
+        <p:txBody>
+          <a:bodyPr wrap="none" rtlCol="0" anchor="ctr"/>
+          <a:lstStyle/>
+          <a:p>
+            <a:pPr algn="ctr"/>
+            <a:endParaRPr lang="en-IN" dirty="0" smtClean="0"/>
+          </a:p>
+          <a:p>
+            <a:pPr algn="ctr"/>
+            <a:r>
+              <a:rPr lang="en-IN" dirty="0" err="1" smtClean="0"/>
+              <a:t>cur_card</a:t>
+            </a:r>
+            <a:r>
+              <a:rPr lang="en-IN" dirty="0" smtClean="0"/>
+              <a:t> &lt; </a:t>
+            </a:r>
+            <a:r>
+              <a:rPr lang="en-IN" dirty="0" err="1" smtClean="0"/>
+              <a:t>in_card</a:t>
+            </a:r>
+            <a:endParaRPr lang="en-IN" dirty="0" smtClean="0"/>
+          </a:p>
+          <a:p>
+            <a:pPr algn="ctr"/>
+            <a:r>
+              <a:rPr lang="en-IN" dirty="0" smtClean="0"/>
+              <a:t>?</a:t>
+            </a:r>
+            <a:r>
+              <a:rPr lang="en-IN" dirty="0" smtClean="0"/>
+              <a:t> </a:t>
+            </a:r>
+            <a:endParaRPr lang="en-US" dirty="0"/>
+          </a:p>
+        </p:txBody>
+      </p:sp>
+      <p:sp>
+        <p:nvSpPr>
+          <p:cNvPr id="10" name="Rectangle 9"/>
+          <p:cNvSpPr/>
+          <p:nvPr/>
+        </p:nvSpPr>
+        <p:spPr>
+          <a:xfrm>
+            <a:off x="1071546" y="7024702"/>
+            <a:ext cx="2786082" cy="500066"/>
+          </a:xfrm>
+          <a:prstGeom prst="rect">
+            <a:avLst/>
+          </a:prstGeom>
+        </p:spPr>
+        <p:style>
+          <a:lnRef idx="2">
+            <a:schemeClr val="dk1"/>
+          </a:lnRef>
+          <a:fillRef idx="1">
+            <a:schemeClr val="lt1"/>
+          </a:fillRef>
+          <a:effectRef idx="0">
+            <a:schemeClr val="dk1"/>
+          </a:effectRef>
+          <a:fontRef idx="minor">
+            <a:schemeClr val="dk1"/>
+          </a:fontRef>
+        </p:style>
+        <p:txBody>
+          <a:bodyPr wrap="none" rtlCol="0" anchor="ctr"/>
+          <a:lstStyle/>
+          <a:p>
+            <a:pPr algn="ctr"/>
+            <a:r>
+              <a:rPr lang="en-IN" dirty="0" err="1" smtClean="0"/>
+              <a:t>temp</a:t>
+            </a:r>
+            <a:r>
+              <a:rPr lang="en-IN" dirty="0" err="1" smtClean="0"/>
+              <a:t>_cards</a:t>
+            </a:r>
+            <a:r>
+              <a:rPr lang="en-IN" dirty="0" smtClean="0"/>
+              <a:t>[j] = </a:t>
+            </a:r>
+            <a:r>
+              <a:rPr lang="en-IN" dirty="0" err="1" smtClean="0"/>
+              <a:t>my_cards</a:t>
+            </a:r>
+            <a:r>
+              <a:rPr lang="en-IN" dirty="0" smtClean="0"/>
+              <a:t>[</a:t>
+            </a:r>
+            <a:r>
+              <a:rPr lang="en-IN" dirty="0" err="1" smtClean="0"/>
+              <a:t>i</a:t>
+            </a:r>
+            <a:r>
+              <a:rPr lang="en-IN" dirty="0" smtClean="0"/>
+              <a:t>]</a:t>
+            </a:r>
+            <a:r>
+              <a:rPr lang="en-IN" dirty="0" smtClean="0"/>
+              <a:t> </a:t>
+            </a:r>
+            <a:endParaRPr lang="en-US" dirty="0"/>
+          </a:p>
+        </p:txBody>
+      </p:sp>
+      <p:sp>
+        <p:nvSpPr>
+          <p:cNvPr id="11" name="Flowchart: Decision 10"/>
+          <p:cNvSpPr/>
+          <p:nvPr/>
+        </p:nvSpPr>
+        <p:spPr>
+          <a:xfrm>
+            <a:off x="4000480" y="6453198"/>
+            <a:ext cx="2000288" cy="1143008"/>
+          </a:xfrm>
+          <a:prstGeom prst="flowChartDecision">
+            <a:avLst/>
+          </a:prstGeom>
+        </p:spPr>
+        <p:style>
+          <a:lnRef idx="2">
+            <a:schemeClr val="dk1"/>
+          </a:lnRef>
+          <a:fillRef idx="1">
+            <a:schemeClr val="lt1"/>
+          </a:fillRef>
+          <a:effectRef idx="0">
+            <a:schemeClr val="dk1"/>
+          </a:effectRef>
+          <a:fontRef idx="minor">
+            <a:schemeClr val="dk1"/>
+          </a:fontRef>
+        </p:style>
+        <p:txBody>
+          <a:bodyPr wrap="none" rtlCol="0" anchor="ctr"/>
+          <a:lstStyle/>
+          <a:p>
+            <a:pPr algn="ctr"/>
+            <a:endParaRPr lang="en-IN" dirty="0" smtClean="0"/>
+          </a:p>
+          <a:p>
+            <a:pPr algn="ctr"/>
+            <a:r>
+              <a:rPr lang="en-IN" dirty="0" smtClean="0"/>
+              <a:t>flag = 0</a:t>
+            </a:r>
+          </a:p>
+          <a:p>
+            <a:pPr algn="ctr"/>
+            <a:r>
+              <a:rPr lang="en-IN" dirty="0" smtClean="0"/>
+              <a:t>?</a:t>
+            </a:r>
+            <a:endParaRPr lang="en-US" dirty="0"/>
+          </a:p>
+        </p:txBody>
+      </p:sp>
+      <p:cxnSp>
+        <p:nvCxnSpPr>
+          <p:cNvPr id="13" name="Straight Arrow Connector 12"/>
+          <p:cNvCxnSpPr>
+            <a:stCxn id="2" idx="4"/>
+            <a:endCxn id="3" idx="0"/>
+          </p:cNvCxnSpPr>
+          <p:nvPr/>
+        </p:nvCxnSpPr>
+        <p:spPr>
+          <a:xfrm rot="5400000">
+            <a:off x="2321711" y="1381100"/>
+            <a:ext cx="285752" cy="1588"/>
+          </a:xfrm>
+          <a:prstGeom prst="straightConnector1">
+            <a:avLst/>
+          </a:prstGeom>
+          <a:ln>
+            <a:tailEnd type="arrow"/>
+          </a:ln>
+        </p:spPr>
+        <p:style>
+          <a:lnRef idx="1">
+            <a:schemeClr val="dk1"/>
+          </a:lnRef>
+          <a:fillRef idx="0">
+            <a:schemeClr val="dk1"/>
+          </a:fillRef>
+          <a:effectRef idx="0">
+            <a:schemeClr val="dk1"/>
+          </a:effectRef>
+          <a:fontRef idx="minor">
+            <a:schemeClr val="tx1"/>
+          </a:fontRef>
+        </p:style>
+      </p:cxnSp>
+      <p:cxnSp>
+        <p:nvCxnSpPr>
+          <p:cNvPr id="16" name="Straight Arrow Connector 15"/>
+          <p:cNvCxnSpPr>
+            <a:stCxn id="3" idx="2"/>
+            <a:endCxn id="5" idx="0"/>
+          </p:cNvCxnSpPr>
+          <p:nvPr/>
+        </p:nvCxnSpPr>
+        <p:spPr>
+          <a:xfrm rot="5400000">
+            <a:off x="2321711" y="2309794"/>
+            <a:ext cx="285752" cy="1588"/>
+          </a:xfrm>
+          <a:prstGeom prst="straightConnector1">
+            <a:avLst/>
+          </a:prstGeom>
+          <a:ln>
+            <a:tailEnd type="arrow"/>
+          </a:ln>
+        </p:spPr>
+        <p:style>
+          <a:lnRef idx="1">
+            <a:schemeClr val="dk1"/>
+          </a:lnRef>
+          <a:fillRef idx="0">
+            <a:schemeClr val="dk1"/>
+          </a:fillRef>
+          <a:effectRef idx="0">
+            <a:schemeClr val="dk1"/>
+          </a:effectRef>
+          <a:fontRef idx="minor">
+            <a:schemeClr val="tx1"/>
+          </a:fontRef>
+        </p:style>
+      </p:cxnSp>
+      <p:cxnSp>
+        <p:nvCxnSpPr>
+          <p:cNvPr id="19" name="Straight Arrow Connector 18"/>
+          <p:cNvCxnSpPr>
+            <a:stCxn id="5" idx="2"/>
+            <a:endCxn id="6" idx="0"/>
+          </p:cNvCxnSpPr>
+          <p:nvPr/>
+        </p:nvCxnSpPr>
+        <p:spPr>
+          <a:xfrm rot="5400000">
+            <a:off x="2357430" y="3059893"/>
+            <a:ext cx="214314" cy="1588"/>
+          </a:xfrm>
+          <a:prstGeom prst="straightConnector1">
+            <a:avLst/>
+          </a:prstGeom>
+          <a:ln>
+            <a:tailEnd type="arrow"/>
+          </a:ln>
+        </p:spPr>
+        <p:style>
+          <a:lnRef idx="1">
+            <a:schemeClr val="dk1"/>
+          </a:lnRef>
+          <a:fillRef idx="0">
+            <a:schemeClr val="dk1"/>
+          </a:fillRef>
+          <a:effectRef idx="0">
+            <a:schemeClr val="dk1"/>
+          </a:effectRef>
+          <a:fontRef idx="minor">
+            <a:schemeClr val="tx1"/>
+          </a:fontRef>
+        </p:style>
+      </p:cxnSp>
+      <p:cxnSp>
+        <p:nvCxnSpPr>
+          <p:cNvPr id="22" name="Straight Arrow Connector 21"/>
+          <p:cNvCxnSpPr>
+            <a:stCxn id="6" idx="2"/>
+            <a:endCxn id="7" idx="0"/>
+          </p:cNvCxnSpPr>
+          <p:nvPr/>
+        </p:nvCxnSpPr>
+        <p:spPr>
+          <a:xfrm rot="5400000">
+            <a:off x="2321711" y="3809992"/>
+            <a:ext cx="285752" cy="1588"/>
+          </a:xfrm>
+          <a:prstGeom prst="straightConnector1">
+            <a:avLst/>
+          </a:prstGeom>
+          <a:ln>
+            <a:tailEnd type="arrow"/>
+          </a:ln>
+        </p:spPr>
+        <p:style>
+          <a:lnRef idx="1">
+            <a:schemeClr val="dk1"/>
+          </a:lnRef>
+          <a:fillRef idx="0">
+            <a:schemeClr val="dk1"/>
+          </a:fillRef>
+          <a:effectRef idx="0">
+            <a:schemeClr val="dk1"/>
+          </a:effectRef>
+          <a:fontRef idx="minor">
+            <a:schemeClr val="tx1"/>
+          </a:fontRef>
+        </p:style>
+      </p:cxnSp>
+      <p:cxnSp>
+        <p:nvCxnSpPr>
+          <p:cNvPr id="25" name="Straight Arrow Connector 24"/>
+          <p:cNvCxnSpPr>
+            <a:stCxn id="7" idx="2"/>
+            <a:endCxn id="8" idx="0"/>
+          </p:cNvCxnSpPr>
+          <p:nvPr/>
+        </p:nvCxnSpPr>
+        <p:spPr>
+          <a:xfrm rot="5400000">
+            <a:off x="2321711" y="4595810"/>
+            <a:ext cx="285752" cy="1588"/>
+          </a:xfrm>
+          <a:prstGeom prst="straightConnector1">
+            <a:avLst/>
+          </a:prstGeom>
+          <a:ln>
+            <a:tailEnd type="arrow"/>
+          </a:ln>
+        </p:spPr>
+        <p:style>
+          <a:lnRef idx="1">
+            <a:schemeClr val="dk1"/>
+          </a:lnRef>
+          <a:fillRef idx="0">
+            <a:schemeClr val="dk1"/>
+          </a:fillRef>
+          <a:effectRef idx="0">
+            <a:schemeClr val="dk1"/>
+          </a:effectRef>
+          <a:fontRef idx="minor">
+            <a:schemeClr val="tx1"/>
+          </a:fontRef>
+        </p:style>
+      </p:cxnSp>
+      <p:cxnSp>
+        <p:nvCxnSpPr>
+          <p:cNvPr id="28" name="Straight Arrow Connector 27"/>
+          <p:cNvCxnSpPr>
+            <a:stCxn id="8" idx="2"/>
+            <a:endCxn id="9" idx="0"/>
+          </p:cNvCxnSpPr>
+          <p:nvPr/>
+        </p:nvCxnSpPr>
+        <p:spPr>
+          <a:xfrm rot="5400000">
+            <a:off x="2321711" y="5381628"/>
+            <a:ext cx="285752" cy="1588"/>
+          </a:xfrm>
+          <a:prstGeom prst="straightConnector1">
+            <a:avLst/>
+          </a:prstGeom>
+          <a:ln>
+            <a:tailEnd type="arrow"/>
+          </a:ln>
+        </p:spPr>
+        <p:style>
+          <a:lnRef idx="1">
+            <a:schemeClr val="dk1"/>
+          </a:lnRef>
+          <a:fillRef idx="0">
+            <a:schemeClr val="dk1"/>
+          </a:fillRef>
+          <a:effectRef idx="0">
+            <a:schemeClr val="dk1"/>
+          </a:effectRef>
+          <a:fontRef idx="minor">
+            <a:schemeClr val="tx1"/>
+          </a:fontRef>
+        </p:style>
+      </p:cxnSp>
+      <p:cxnSp>
+        <p:nvCxnSpPr>
+          <p:cNvPr id="31" name="Straight Arrow Connector 30"/>
+          <p:cNvCxnSpPr>
+            <a:stCxn id="9" idx="2"/>
+            <a:endCxn id="10" idx="0"/>
+          </p:cNvCxnSpPr>
+          <p:nvPr/>
+        </p:nvCxnSpPr>
+        <p:spPr>
+          <a:xfrm rot="5400000">
+            <a:off x="2285992" y="6846107"/>
+            <a:ext cx="357190" cy="1588"/>
+          </a:xfrm>
+          <a:prstGeom prst="straightConnector1">
+            <a:avLst/>
+          </a:prstGeom>
+          <a:ln>
+            <a:tailEnd type="arrow"/>
+          </a:ln>
+        </p:spPr>
+        <p:style>
+          <a:lnRef idx="1">
+            <a:schemeClr val="dk1"/>
+          </a:lnRef>
+          <a:fillRef idx="0">
+            <a:schemeClr val="dk1"/>
+          </a:fillRef>
+          <a:effectRef idx="0">
+            <a:schemeClr val="dk1"/>
+          </a:effectRef>
+          <a:fontRef idx="minor">
+            <a:schemeClr val="tx1"/>
+          </a:fontRef>
+        </p:style>
+      </p:cxnSp>
+      <p:sp>
+        <p:nvSpPr>
+          <p:cNvPr id="37" name="Oval 36"/>
+          <p:cNvSpPr/>
+          <p:nvPr/>
+        </p:nvSpPr>
+        <p:spPr>
+          <a:xfrm>
+            <a:off x="2239954" y="8023248"/>
+            <a:ext cx="428628" cy="428628"/>
+          </a:xfrm>
+          <a:prstGeom prst="ellipse">
+            <a:avLst/>
+          </a:prstGeom>
+        </p:spPr>
+        <p:style>
+          <a:lnRef idx="2">
+            <a:schemeClr val="dk1"/>
+          </a:lnRef>
+          <a:fillRef idx="1">
+            <a:schemeClr val="lt1"/>
+          </a:fillRef>
+          <a:effectRef idx="0">
+            <a:schemeClr val="dk1"/>
+          </a:effectRef>
+          <a:fontRef idx="minor">
+            <a:schemeClr val="dk1"/>
+          </a:fontRef>
+        </p:style>
+        <p:txBody>
+          <a:bodyPr wrap="none" rtlCol="0" anchor="ctr"/>
+          <a:lstStyle/>
+          <a:p>
+            <a:pPr algn="ctr"/>
+            <a:r>
+              <a:rPr lang="en-IN" dirty="0" smtClean="0"/>
+              <a:t>A</a:t>
+            </a:r>
+            <a:endParaRPr lang="en-US" dirty="0"/>
+          </a:p>
+        </p:txBody>
+      </p:sp>
+      <p:cxnSp>
+        <p:nvCxnSpPr>
+          <p:cNvPr id="38" name="Straight Arrow Connector 37"/>
+          <p:cNvCxnSpPr>
+            <a:stCxn id="10" idx="2"/>
+            <a:endCxn id="37" idx="0"/>
+          </p:cNvCxnSpPr>
+          <p:nvPr/>
+        </p:nvCxnSpPr>
+        <p:spPr>
+          <a:xfrm rot="5400000">
+            <a:off x="2210188" y="7768849"/>
+            <a:ext cx="498480" cy="10319"/>
+          </a:xfrm>
+          <a:prstGeom prst="straightConnector1">
+            <a:avLst/>
+          </a:prstGeom>
+          <a:ln>
+            <a:tailEnd type="arrow"/>
+          </a:ln>
+        </p:spPr>
+        <p:style>
+          <a:lnRef idx="1">
+            <a:schemeClr val="dk1"/>
+          </a:lnRef>
+          <a:fillRef idx="0">
+            <a:schemeClr val="dk1"/>
+          </a:fillRef>
+          <a:effectRef idx="0">
+            <a:schemeClr val="dk1"/>
+          </a:effectRef>
+          <a:fontRef idx="minor">
+            <a:schemeClr val="tx1"/>
+          </a:fontRef>
+        </p:style>
+      </p:cxnSp>
+      <p:sp>
+        <p:nvSpPr>
+          <p:cNvPr id="41" name="TextBox 40"/>
+          <p:cNvSpPr txBox="1"/>
+          <p:nvPr/>
+        </p:nvSpPr>
+        <p:spPr>
+          <a:xfrm>
+            <a:off x="2714620" y="6596074"/>
+            <a:ext cx="599972" cy="369332"/>
+          </a:xfrm>
+          <a:prstGeom prst="rect">
+            <a:avLst/>
+          </a:prstGeom>
+          <a:noFill/>
+        </p:spPr>
+        <p:txBody>
+          <a:bodyPr wrap="none" rtlCol="0">
+            <a:spAutoFit/>
+          </a:bodyPr>
+          <a:lstStyle/>
+          <a:p>
+            <a:r>
+              <a:rPr lang="en-IN" dirty="0" smtClean="0"/>
+              <a:t>True</a:t>
+            </a:r>
+            <a:endParaRPr lang="en-US" dirty="0"/>
+          </a:p>
+        </p:txBody>
+      </p:sp>
+      <p:sp>
+        <p:nvSpPr>
+          <p:cNvPr id="42" name="TextBox 41"/>
+          <p:cNvSpPr txBox="1"/>
+          <p:nvPr/>
+        </p:nvSpPr>
+        <p:spPr>
+          <a:xfrm>
+            <a:off x="4071942" y="5667380"/>
+            <a:ext cx="652936" cy="369332"/>
+          </a:xfrm>
+          <a:prstGeom prst="rect">
+            <a:avLst/>
+          </a:prstGeom>
+          <a:noFill/>
+        </p:spPr>
+        <p:txBody>
+          <a:bodyPr wrap="none" rtlCol="0">
+            <a:spAutoFit/>
+          </a:bodyPr>
+          <a:lstStyle/>
+          <a:p>
+            <a:r>
+              <a:rPr lang="en-IN" dirty="0" smtClean="0"/>
+              <a:t>False</a:t>
+            </a:r>
+            <a:endParaRPr lang="en-US" dirty="0"/>
+          </a:p>
+        </p:txBody>
+      </p:sp>
+      <p:cxnSp>
+        <p:nvCxnSpPr>
+          <p:cNvPr id="43" name="Elbow Connector 77"/>
+          <p:cNvCxnSpPr>
+            <a:stCxn id="9" idx="3"/>
+            <a:endCxn id="11" idx="0"/>
+          </p:cNvCxnSpPr>
+          <p:nvPr/>
+        </p:nvCxnSpPr>
+        <p:spPr>
+          <a:xfrm>
+            <a:off x="3786190" y="6096008"/>
+            <a:ext cx="1214434" cy="357190"/>
+          </a:xfrm>
+          <a:prstGeom prst="bentConnector2">
+            <a:avLst/>
+          </a:prstGeom>
+          <a:ln>
+            <a:tailEnd type="arrow"/>
+          </a:ln>
+        </p:spPr>
+        <p:style>
+          <a:lnRef idx="1">
+            <a:schemeClr val="dk1"/>
+          </a:lnRef>
+          <a:fillRef idx="0">
+            <a:schemeClr val="dk1"/>
+          </a:fillRef>
+          <a:effectRef idx="0">
+            <a:schemeClr val="dk1"/>
+          </a:effectRef>
+          <a:fontRef idx="minor">
+            <a:schemeClr val="tx1"/>
+          </a:fontRef>
+        </p:style>
+      </p:cxnSp>
+      <p:cxnSp>
+        <p:nvCxnSpPr>
+          <p:cNvPr id="54" name="Straight Arrow Connector 53"/>
+          <p:cNvCxnSpPr>
+            <a:stCxn id="11" idx="2"/>
+            <a:endCxn id="57" idx="0"/>
+          </p:cNvCxnSpPr>
+          <p:nvPr/>
+        </p:nvCxnSpPr>
+        <p:spPr>
+          <a:xfrm rot="5400000">
+            <a:off x="4780759" y="7803383"/>
+            <a:ext cx="427042" cy="12688"/>
+          </a:xfrm>
+          <a:prstGeom prst="straightConnector1">
+            <a:avLst/>
+          </a:prstGeom>
+          <a:ln>
+            <a:tailEnd type="arrow"/>
+          </a:ln>
+        </p:spPr>
+        <p:style>
+          <a:lnRef idx="1">
+            <a:schemeClr val="dk1"/>
+          </a:lnRef>
+          <a:fillRef idx="0">
+            <a:schemeClr val="dk1"/>
+          </a:fillRef>
+          <a:effectRef idx="0">
+            <a:schemeClr val="dk1"/>
+          </a:effectRef>
+          <a:fontRef idx="minor">
+            <a:schemeClr val="tx1"/>
+          </a:fontRef>
+        </p:style>
+      </p:cxnSp>
+      <p:sp>
+        <p:nvSpPr>
+          <p:cNvPr id="57" name="Oval 56"/>
+          <p:cNvSpPr/>
+          <p:nvPr/>
+        </p:nvSpPr>
+        <p:spPr>
+          <a:xfrm>
+            <a:off x="4773622" y="8023248"/>
+            <a:ext cx="428628" cy="428628"/>
+          </a:xfrm>
+          <a:prstGeom prst="ellipse">
+            <a:avLst/>
+          </a:prstGeom>
+        </p:spPr>
+        <p:style>
+          <a:lnRef idx="2">
+            <a:schemeClr val="dk1"/>
+          </a:lnRef>
+          <a:fillRef idx="1">
+            <a:schemeClr val="lt1"/>
+          </a:fillRef>
+          <a:effectRef idx="0">
+            <a:schemeClr val="dk1"/>
+          </a:effectRef>
+          <a:fontRef idx="minor">
+            <a:schemeClr val="dk1"/>
+          </a:fontRef>
+        </p:style>
+        <p:txBody>
+          <a:bodyPr wrap="none" rtlCol="0" anchor="ctr"/>
+          <a:lstStyle/>
+          <a:p>
+            <a:pPr algn="ctr"/>
+            <a:r>
+              <a:rPr lang="en-IN" dirty="0" smtClean="0"/>
+              <a:t>B</a:t>
+            </a:r>
+            <a:endParaRPr lang="en-US" dirty="0"/>
+          </a:p>
+        </p:txBody>
+      </p:sp>
+      <p:sp>
+        <p:nvSpPr>
+          <p:cNvPr id="61" name="Oval 60"/>
+          <p:cNvSpPr/>
+          <p:nvPr/>
+        </p:nvSpPr>
+        <p:spPr>
+          <a:xfrm>
+            <a:off x="6072206" y="8023248"/>
+            <a:ext cx="428628" cy="428628"/>
+          </a:xfrm>
+          <a:prstGeom prst="ellipse">
+            <a:avLst/>
+          </a:prstGeom>
+        </p:spPr>
+        <p:style>
+          <a:lnRef idx="2">
+            <a:schemeClr val="dk1"/>
+          </a:lnRef>
+          <a:fillRef idx="1">
+            <a:schemeClr val="lt1"/>
+          </a:fillRef>
+          <a:effectRef idx="0">
+            <a:schemeClr val="dk1"/>
+          </a:effectRef>
+          <a:fontRef idx="minor">
+            <a:schemeClr val="dk1"/>
+          </a:fontRef>
+        </p:style>
+        <p:txBody>
+          <a:bodyPr wrap="none" rtlCol="0" anchor="ctr"/>
+          <a:lstStyle/>
+          <a:p>
+            <a:pPr algn="ctr"/>
+            <a:r>
+              <a:rPr lang="en-IN" dirty="0" smtClean="0"/>
+              <a:t>C</a:t>
+            </a:r>
+            <a:endParaRPr lang="en-US" dirty="0"/>
+          </a:p>
+        </p:txBody>
+      </p:sp>
+      <p:cxnSp>
+        <p:nvCxnSpPr>
+          <p:cNvPr id="66" name="Elbow Connector 77"/>
+          <p:cNvCxnSpPr>
+            <a:stCxn id="11" idx="3"/>
+            <a:endCxn id="61" idx="0"/>
+          </p:cNvCxnSpPr>
+          <p:nvPr/>
+        </p:nvCxnSpPr>
+        <p:spPr>
+          <a:xfrm>
+            <a:off x="6000768" y="7024702"/>
+            <a:ext cx="285752" cy="998546"/>
+          </a:xfrm>
+          <a:prstGeom prst="bentConnector2">
+            <a:avLst/>
+          </a:prstGeom>
+          <a:ln>
+            <a:tailEnd type="arrow"/>
+          </a:ln>
+        </p:spPr>
+        <p:style>
+          <a:lnRef idx="1">
+            <a:schemeClr val="dk1"/>
+          </a:lnRef>
+          <a:fillRef idx="0">
+            <a:schemeClr val="dk1"/>
+          </a:fillRef>
+          <a:effectRef idx="0">
+            <a:schemeClr val="dk1"/>
+          </a:effectRef>
+          <a:fontRef idx="minor">
+            <a:schemeClr val="tx1"/>
+          </a:fontRef>
+        </p:style>
+      </p:cxnSp>
+      <p:sp>
+        <p:nvSpPr>
+          <p:cNvPr id="69" name="Oval 68"/>
+          <p:cNvSpPr/>
+          <p:nvPr/>
+        </p:nvSpPr>
+        <p:spPr>
+          <a:xfrm>
+            <a:off x="428604" y="8024834"/>
+            <a:ext cx="428628" cy="428628"/>
+          </a:xfrm>
+          <a:prstGeom prst="ellipse">
+            <a:avLst/>
+          </a:prstGeom>
+        </p:spPr>
+        <p:style>
+          <a:lnRef idx="2">
+            <a:schemeClr val="dk1"/>
+          </a:lnRef>
+          <a:fillRef idx="1">
+            <a:schemeClr val="lt1"/>
+          </a:fillRef>
+          <a:effectRef idx="0">
+            <a:schemeClr val="dk1"/>
+          </a:effectRef>
+          <a:fontRef idx="minor">
+            <a:schemeClr val="dk1"/>
+          </a:fontRef>
+        </p:style>
+        <p:txBody>
+          <a:bodyPr wrap="none" rtlCol="0" anchor="ctr"/>
+          <a:lstStyle/>
+          <a:p>
+            <a:pPr algn="ctr"/>
+            <a:r>
+              <a:rPr lang="en-IN" dirty="0" smtClean="0"/>
+              <a:t>D</a:t>
+            </a:r>
+            <a:endParaRPr lang="en-US" dirty="0"/>
+          </a:p>
+        </p:txBody>
+      </p:sp>
+      <p:cxnSp>
+        <p:nvCxnSpPr>
+          <p:cNvPr id="70" name="Elbow Connector 77"/>
+          <p:cNvCxnSpPr>
+            <a:stCxn id="69" idx="0"/>
+            <a:endCxn id="8" idx="1"/>
+          </p:cNvCxnSpPr>
+          <p:nvPr/>
+        </p:nvCxnSpPr>
+        <p:spPr>
+          <a:xfrm rot="5400000" flipH="1" flipV="1">
+            <a:off x="-660825" y="6292463"/>
+            <a:ext cx="3036115" cy="428628"/>
+          </a:xfrm>
+          <a:prstGeom prst="bentConnector2">
+            <a:avLst/>
+          </a:prstGeom>
+          <a:ln>
+            <a:tailEnd type="arrow"/>
+          </a:ln>
+        </p:spPr>
+        <p:style>
+          <a:lnRef idx="1">
+            <a:schemeClr val="dk1"/>
+          </a:lnRef>
+          <a:fillRef idx="0">
+            <a:schemeClr val="dk1"/>
+          </a:fillRef>
+          <a:effectRef idx="0">
+            <a:schemeClr val="dk1"/>
+          </a:effectRef>
+          <a:fontRef idx="minor">
+            <a:schemeClr val="tx1"/>
+          </a:fontRef>
+        </p:style>
+      </p:cxnSp>
+    </p:spTree>
+  </p:cSld>
+  <p:clrMapOvr>
+    <a:masterClrMapping/>
+  </p:clrMapOvr>
+</p:sld>
+</file>
+
+<file path=ppt/slides/slide8.xml><?xml version="1.0" encoding="utf-8"?>
+<p:sld xmlns:a="http://schemas.openxmlformats.org/drawingml/2006/main" xmlns:r="http://schemas.openxmlformats.org/officeDocument/2006/relationships" xmlns:p="http://schemas.openxmlformats.org/presentationml/2006/main">
+  <p:cSld>
+    <p:spTree>
+      <p:nvGrpSpPr>
+        <p:cNvPr id="1" name=""/>
+        <p:cNvGrpSpPr/>
+        <p:nvPr/>
+      </p:nvGrpSpPr>
+      <p:grpSpPr>
+        <a:xfrm>
+          <a:off x="0" y="0"/>
+          <a:ext cx="0" cy="0"/>
+          <a:chOff x="0" y="0"/>
+          <a:chExt cx="0" cy="0"/>
+        </a:xfrm>
+      </p:grpSpPr>
+      <p:sp>
+        <p:nvSpPr>
+          <p:cNvPr id="2" name="Rectangle 1"/>
+          <p:cNvSpPr/>
+          <p:nvPr/>
+        </p:nvSpPr>
+        <p:spPr>
+          <a:xfrm>
+            <a:off x="1785926" y="1666852"/>
+            <a:ext cx="2428892" cy="1071570"/>
+          </a:xfrm>
+          <a:prstGeom prst="rect">
+            <a:avLst/>
+          </a:prstGeom>
+        </p:spPr>
+        <p:style>
+          <a:lnRef idx="2">
+            <a:schemeClr val="dk1"/>
+          </a:lnRef>
+          <a:fillRef idx="1">
+            <a:schemeClr val="lt1"/>
+          </a:fillRef>
+          <a:effectRef idx="0">
+            <a:schemeClr val="dk1"/>
+          </a:effectRef>
+          <a:fontRef idx="minor">
+            <a:schemeClr val="dk1"/>
+          </a:fontRef>
+        </p:style>
+        <p:txBody>
+          <a:bodyPr wrap="none" rtlCol="0" anchor="ctr"/>
+          <a:lstStyle/>
+          <a:p>
+            <a:pPr algn="ctr"/>
+            <a:r>
+              <a:rPr lang="en-IN" dirty="0" err="1" smtClean="0"/>
+              <a:t>temp</a:t>
+            </a:r>
+            <a:r>
+              <a:rPr lang="en-IN" dirty="0" err="1" smtClean="0"/>
+              <a:t>_cards</a:t>
+            </a:r>
+            <a:r>
+              <a:rPr lang="en-IN" dirty="0" smtClean="0"/>
+              <a:t>[j] = </a:t>
+            </a:r>
+            <a:r>
+              <a:rPr lang="en-IN" dirty="0" err="1" smtClean="0"/>
+              <a:t>in_card</a:t>
+            </a:r>
+            <a:endParaRPr lang="en-IN" dirty="0" smtClean="0"/>
+          </a:p>
+          <a:p>
+            <a:pPr algn="ctr"/>
+            <a:r>
+              <a:rPr lang="en-IN" dirty="0" smtClean="0"/>
+              <a:t>f</a:t>
+            </a:r>
+            <a:r>
+              <a:rPr lang="en-IN" dirty="0" smtClean="0"/>
+              <a:t>lag = 0</a:t>
+            </a:r>
+          </a:p>
+          <a:p>
+            <a:pPr algn="ctr"/>
+            <a:r>
+              <a:rPr lang="en-IN" dirty="0" smtClean="0"/>
+              <a:t>J = j + 1</a:t>
+            </a:r>
+            <a:endParaRPr lang="en-US" dirty="0"/>
+          </a:p>
+        </p:txBody>
+      </p:sp>
+      <p:sp>
+        <p:nvSpPr>
+          <p:cNvPr id="5" name="Rectangle 4"/>
+          <p:cNvSpPr/>
+          <p:nvPr/>
+        </p:nvSpPr>
+        <p:spPr>
+          <a:xfrm>
+            <a:off x="1607331" y="3309926"/>
+            <a:ext cx="2786082" cy="500066"/>
+          </a:xfrm>
+          <a:prstGeom prst="rect">
+            <a:avLst/>
+          </a:prstGeom>
+        </p:spPr>
+        <p:style>
+          <a:lnRef idx="2">
+            <a:schemeClr val="dk1"/>
+          </a:lnRef>
+          <a:fillRef idx="1">
+            <a:schemeClr val="lt1"/>
+          </a:fillRef>
+          <a:effectRef idx="0">
+            <a:schemeClr val="dk1"/>
+          </a:effectRef>
+          <a:fontRef idx="minor">
+            <a:schemeClr val="dk1"/>
+          </a:fontRef>
+        </p:style>
+        <p:txBody>
+          <a:bodyPr wrap="none" rtlCol="0" anchor="ctr"/>
+          <a:lstStyle/>
+          <a:p>
+            <a:pPr algn="ctr"/>
+            <a:r>
+              <a:rPr lang="en-IN" dirty="0" err="1" smtClean="0"/>
+              <a:t>temp</a:t>
+            </a:r>
+            <a:r>
+              <a:rPr lang="en-IN" dirty="0" err="1" smtClean="0"/>
+              <a:t>_cards</a:t>
+            </a:r>
+            <a:r>
+              <a:rPr lang="en-IN" dirty="0" smtClean="0"/>
+              <a:t>[j] = </a:t>
+            </a:r>
+            <a:r>
+              <a:rPr lang="en-IN" dirty="0" err="1" smtClean="0"/>
+              <a:t>my_cards</a:t>
+            </a:r>
+            <a:r>
+              <a:rPr lang="en-IN" dirty="0" smtClean="0"/>
+              <a:t>[</a:t>
+            </a:r>
+            <a:r>
+              <a:rPr lang="en-IN" dirty="0" err="1" smtClean="0"/>
+              <a:t>i</a:t>
+            </a:r>
+            <a:r>
+              <a:rPr lang="en-IN" dirty="0" smtClean="0"/>
+              <a:t>]</a:t>
+            </a:r>
+            <a:r>
+              <a:rPr lang="en-IN" dirty="0" smtClean="0"/>
+              <a:t> </a:t>
+            </a:r>
+            <a:endParaRPr lang="en-US" dirty="0"/>
+          </a:p>
+        </p:txBody>
+      </p:sp>
+      <p:sp>
+        <p:nvSpPr>
+          <p:cNvPr id="6" name="Rectangle 5"/>
+          <p:cNvSpPr/>
+          <p:nvPr/>
+        </p:nvSpPr>
+        <p:spPr>
+          <a:xfrm>
+            <a:off x="1607331" y="4095744"/>
+            <a:ext cx="2786082" cy="500066"/>
+          </a:xfrm>
+          <a:prstGeom prst="rect">
+            <a:avLst/>
+          </a:prstGeom>
+        </p:spPr>
+        <p:style>
+          <a:lnRef idx="2">
+            <a:schemeClr val="dk1"/>
+          </a:lnRef>
+          <a:fillRef idx="1">
+            <a:schemeClr val="lt1"/>
+          </a:fillRef>
+          <a:effectRef idx="0">
+            <a:schemeClr val="dk1"/>
+          </a:effectRef>
+          <a:fontRef idx="minor">
+            <a:schemeClr val="dk1"/>
+          </a:fontRef>
+        </p:style>
+        <p:txBody>
+          <a:bodyPr wrap="none" rtlCol="0" anchor="ctr"/>
+          <a:lstStyle/>
+          <a:p>
+            <a:pPr algn="ctr"/>
+            <a:r>
+              <a:rPr lang="en-IN" dirty="0" smtClean="0"/>
+              <a:t>i</a:t>
+            </a:r>
+            <a:r>
+              <a:rPr lang="en-IN" dirty="0" smtClean="0"/>
+              <a:t> = </a:t>
+            </a:r>
+            <a:r>
+              <a:rPr lang="en-IN" dirty="0" err="1" smtClean="0"/>
+              <a:t>i</a:t>
+            </a:r>
+            <a:r>
+              <a:rPr lang="en-IN" dirty="0" smtClean="0"/>
+              <a:t> + 1, j = j + 1</a:t>
+            </a:r>
+            <a:endParaRPr lang="en-US" dirty="0"/>
+          </a:p>
+        </p:txBody>
+      </p:sp>
+      <p:sp>
+        <p:nvSpPr>
+          <p:cNvPr id="7" name="Flowchart: Display 6"/>
+          <p:cNvSpPr/>
+          <p:nvPr/>
+        </p:nvSpPr>
+        <p:spPr>
+          <a:xfrm>
+            <a:off x="2307610" y="7953396"/>
+            <a:ext cx="1459530" cy="500066"/>
+          </a:xfrm>
+          <a:prstGeom prst="flowChartDisplay">
+            <a:avLst/>
+          </a:prstGeom>
+        </p:spPr>
+        <p:style>
+          <a:lnRef idx="2">
+            <a:schemeClr val="dk1"/>
+          </a:lnRef>
+          <a:fillRef idx="1">
+            <a:schemeClr val="lt1"/>
+          </a:fillRef>
+          <a:effectRef idx="0">
+            <a:schemeClr val="dk1"/>
+          </a:effectRef>
+          <a:fontRef idx="minor">
+            <a:schemeClr val="dk1"/>
+          </a:fontRef>
+        </p:style>
+        <p:txBody>
+          <a:bodyPr wrap="none" rtlCol="0" anchor="ctr"/>
+          <a:lstStyle/>
+          <a:p>
+            <a:pPr algn="ctr"/>
+            <a:r>
+              <a:rPr lang="en-IN" dirty="0" err="1" smtClean="0"/>
+              <a:t>m</a:t>
+            </a:r>
+            <a:r>
+              <a:rPr lang="en-IN" dirty="0" err="1" smtClean="0"/>
+              <a:t>y_cards</a:t>
+            </a:r>
+            <a:endParaRPr lang="en-US" dirty="0"/>
+          </a:p>
+        </p:txBody>
+      </p:sp>
+      <p:sp>
+        <p:nvSpPr>
+          <p:cNvPr id="8" name="Rectangle 7"/>
+          <p:cNvSpPr/>
+          <p:nvPr/>
+        </p:nvSpPr>
+        <p:spPr>
+          <a:xfrm>
+            <a:off x="1624000" y="6738950"/>
+            <a:ext cx="2786082" cy="500066"/>
+          </a:xfrm>
+          <a:prstGeom prst="rect">
+            <a:avLst/>
+          </a:prstGeom>
+        </p:spPr>
+        <p:style>
+          <a:lnRef idx="2">
+            <a:schemeClr val="dk1"/>
+          </a:lnRef>
+          <a:fillRef idx="1">
+            <a:schemeClr val="lt1"/>
+          </a:fillRef>
+          <a:effectRef idx="0">
+            <a:schemeClr val="dk1"/>
+          </a:effectRef>
+          <a:fontRef idx="minor">
+            <a:schemeClr val="dk1"/>
+          </a:fontRef>
+        </p:style>
+        <p:txBody>
+          <a:bodyPr wrap="none" rtlCol="0" anchor="ctr"/>
+          <a:lstStyle/>
+          <a:p>
+            <a:pPr algn="ctr"/>
+            <a:r>
+              <a:rPr lang="en-IN" dirty="0" err="1" smtClean="0"/>
+              <a:t>my_cards</a:t>
+            </a:r>
+            <a:r>
+              <a:rPr lang="en-IN" dirty="0" smtClean="0"/>
+              <a:t> </a:t>
+            </a:r>
+            <a:r>
+              <a:rPr lang="en-IN" dirty="0" smtClean="0"/>
+              <a:t>= </a:t>
+            </a:r>
+            <a:r>
+              <a:rPr lang="en-IN" dirty="0" err="1" smtClean="0"/>
+              <a:t>temp_cards</a:t>
+            </a:r>
+            <a:r>
+              <a:rPr lang="en-IN" dirty="0" smtClean="0"/>
+              <a:t> </a:t>
+            </a:r>
+            <a:endParaRPr lang="en-US" dirty="0"/>
+          </a:p>
+        </p:txBody>
+      </p:sp>
+      <p:sp>
+        <p:nvSpPr>
+          <p:cNvPr id="9" name="Oval 8"/>
+          <p:cNvSpPr/>
+          <p:nvPr/>
+        </p:nvSpPr>
+        <p:spPr>
+          <a:xfrm>
+            <a:off x="2385708" y="8739214"/>
+            <a:ext cx="1303334" cy="500066"/>
+          </a:xfrm>
+          <a:prstGeom prst="ellipse">
+            <a:avLst/>
+          </a:prstGeom>
+        </p:spPr>
+        <p:style>
+          <a:lnRef idx="2">
+            <a:schemeClr val="dk1"/>
+          </a:lnRef>
+          <a:fillRef idx="1">
+            <a:schemeClr val="lt1"/>
+          </a:fillRef>
+          <a:effectRef idx="0">
+            <a:schemeClr val="dk1"/>
+          </a:effectRef>
+          <a:fontRef idx="minor">
+            <a:schemeClr val="dk1"/>
+          </a:fontRef>
+        </p:style>
+        <p:txBody>
+          <a:bodyPr wrap="none" rtlCol="0" anchor="ctr"/>
+          <a:lstStyle/>
+          <a:p>
+            <a:pPr algn="ctr"/>
+            <a:r>
+              <a:rPr lang="en-IN" dirty="0" smtClean="0"/>
+              <a:t>stop</a:t>
+            </a:r>
+            <a:endParaRPr lang="en-US" dirty="0"/>
+          </a:p>
+        </p:txBody>
+      </p:sp>
+      <p:cxnSp>
+        <p:nvCxnSpPr>
+          <p:cNvPr id="19" name="Straight Arrow Connector 18"/>
+          <p:cNvCxnSpPr>
+            <a:stCxn id="44" idx="2"/>
+            <a:endCxn id="8" idx="0"/>
+          </p:cNvCxnSpPr>
+          <p:nvPr/>
+        </p:nvCxnSpPr>
+        <p:spPr>
+          <a:xfrm rot="16200000" flipH="1">
+            <a:off x="2830111" y="6552020"/>
+            <a:ext cx="357190" cy="16669"/>
+          </a:xfrm>
+          <a:prstGeom prst="straightConnector1">
+            <a:avLst/>
+          </a:prstGeom>
+          <a:ln>
+            <a:tailEnd type="arrow"/>
+          </a:ln>
+        </p:spPr>
+        <p:style>
+          <a:lnRef idx="1">
+            <a:schemeClr val="dk1"/>
+          </a:lnRef>
+          <a:fillRef idx="0">
+            <a:schemeClr val="dk1"/>
+          </a:fillRef>
+          <a:effectRef idx="0">
+            <a:schemeClr val="dk1"/>
+          </a:effectRef>
+          <a:fontRef idx="minor">
+            <a:schemeClr val="tx1"/>
+          </a:fontRef>
+        </p:style>
+      </p:cxnSp>
+      <p:cxnSp>
+        <p:nvCxnSpPr>
+          <p:cNvPr id="22" name="Straight Arrow Connector 21"/>
+          <p:cNvCxnSpPr>
+            <a:stCxn id="7" idx="2"/>
+            <a:endCxn id="9" idx="0"/>
+          </p:cNvCxnSpPr>
+          <p:nvPr/>
+        </p:nvCxnSpPr>
+        <p:spPr>
+          <a:xfrm rot="5400000">
+            <a:off x="2894499" y="8596338"/>
+            <a:ext cx="285752" cy="1588"/>
+          </a:xfrm>
+          <a:prstGeom prst="straightConnector1">
+            <a:avLst/>
+          </a:prstGeom>
+          <a:ln>
+            <a:tailEnd type="arrow"/>
+          </a:ln>
+        </p:spPr>
+        <p:style>
+          <a:lnRef idx="1">
+            <a:schemeClr val="dk1"/>
+          </a:lnRef>
+          <a:fillRef idx="0">
+            <a:schemeClr val="dk1"/>
+          </a:fillRef>
+          <a:effectRef idx="0">
+            <a:schemeClr val="dk1"/>
+          </a:effectRef>
+          <a:fontRef idx="minor">
+            <a:schemeClr val="tx1"/>
+          </a:fontRef>
+        </p:style>
+      </p:cxnSp>
+      <p:sp>
+        <p:nvSpPr>
+          <p:cNvPr id="44" name="Flowchart: Decision 43"/>
+          <p:cNvSpPr/>
+          <p:nvPr/>
+        </p:nvSpPr>
+        <p:spPr>
+          <a:xfrm>
+            <a:off x="1357298" y="4881562"/>
+            <a:ext cx="3286148" cy="1500198"/>
+          </a:xfrm>
+          <a:prstGeom prst="flowChartDecision">
+            <a:avLst/>
+          </a:prstGeom>
+        </p:spPr>
+        <p:style>
+          <a:lnRef idx="2">
+            <a:schemeClr val="dk1"/>
+          </a:lnRef>
+          <a:fillRef idx="1">
+            <a:schemeClr val="lt1"/>
+          </a:fillRef>
+          <a:effectRef idx="0">
+            <a:schemeClr val="dk1"/>
+          </a:effectRef>
+          <a:fontRef idx="minor">
+            <a:schemeClr val="dk1"/>
+          </a:fontRef>
+        </p:style>
+        <p:txBody>
+          <a:bodyPr wrap="none" rtlCol="0" anchor="ctr"/>
+          <a:lstStyle/>
+          <a:p>
+            <a:pPr algn="ctr"/>
+            <a:r>
+              <a:rPr lang="en-IN" dirty="0" err="1" smtClean="0"/>
+              <a:t>i</a:t>
+            </a:r>
+            <a:r>
+              <a:rPr lang="en-IN" dirty="0" smtClean="0"/>
+              <a:t>  &lt; </a:t>
+            </a:r>
+            <a:r>
+              <a:rPr lang="en-IN" dirty="0" err="1" smtClean="0"/>
+              <a:t>length_of_my_cards</a:t>
+            </a:r>
+            <a:r>
+              <a:rPr lang="en-IN" dirty="0" smtClean="0"/>
+              <a:t> </a:t>
+            </a:r>
+            <a:endParaRPr lang="en-US" dirty="0"/>
+          </a:p>
+        </p:txBody>
+      </p:sp>
+      <p:sp>
+        <p:nvSpPr>
+          <p:cNvPr id="54" name="Oval 53"/>
+          <p:cNvSpPr/>
+          <p:nvPr/>
+        </p:nvSpPr>
+        <p:spPr>
+          <a:xfrm>
+            <a:off x="2239954" y="881034"/>
+            <a:ext cx="428628" cy="428628"/>
+          </a:xfrm>
+          <a:prstGeom prst="ellipse">
+            <a:avLst/>
+          </a:prstGeom>
+        </p:spPr>
+        <p:style>
+          <a:lnRef idx="2">
+            <a:schemeClr val="dk1"/>
+          </a:lnRef>
+          <a:fillRef idx="1">
+            <a:schemeClr val="lt1"/>
+          </a:fillRef>
+          <a:effectRef idx="0">
+            <a:schemeClr val="dk1"/>
+          </a:effectRef>
+          <a:fontRef idx="minor">
+            <a:schemeClr val="dk1"/>
+          </a:fontRef>
+        </p:style>
+        <p:txBody>
+          <a:bodyPr wrap="none" rtlCol="0" anchor="ctr"/>
+          <a:lstStyle/>
+          <a:p>
+            <a:pPr algn="ctr"/>
+            <a:r>
+              <a:rPr lang="en-IN" dirty="0" smtClean="0"/>
+              <a:t>A</a:t>
+            </a:r>
+            <a:endParaRPr lang="en-US" dirty="0"/>
+          </a:p>
+        </p:txBody>
+      </p:sp>
+      <p:sp>
+        <p:nvSpPr>
+          <p:cNvPr id="55" name="Oval 54"/>
+          <p:cNvSpPr/>
+          <p:nvPr/>
+        </p:nvSpPr>
+        <p:spPr>
+          <a:xfrm>
+            <a:off x="4773622" y="881034"/>
+            <a:ext cx="428628" cy="428628"/>
+          </a:xfrm>
+          <a:prstGeom prst="ellipse">
+            <a:avLst/>
+          </a:prstGeom>
+        </p:spPr>
+        <p:style>
+          <a:lnRef idx="2">
+            <a:schemeClr val="dk1"/>
+          </a:lnRef>
+          <a:fillRef idx="1">
+            <a:schemeClr val="lt1"/>
+          </a:fillRef>
+          <a:effectRef idx="0">
+            <a:schemeClr val="dk1"/>
+          </a:effectRef>
+          <a:fontRef idx="minor">
+            <a:schemeClr val="dk1"/>
+          </a:fontRef>
+        </p:style>
+        <p:txBody>
+          <a:bodyPr wrap="none" rtlCol="0" anchor="ctr"/>
+          <a:lstStyle/>
+          <a:p>
+            <a:pPr algn="ctr"/>
+            <a:r>
+              <a:rPr lang="en-IN" dirty="0" smtClean="0"/>
+              <a:t>B</a:t>
+            </a:r>
+            <a:endParaRPr lang="en-US" dirty="0"/>
+          </a:p>
+        </p:txBody>
+      </p:sp>
+      <p:sp>
+        <p:nvSpPr>
+          <p:cNvPr id="56" name="Oval 55"/>
+          <p:cNvSpPr/>
+          <p:nvPr/>
+        </p:nvSpPr>
+        <p:spPr>
+          <a:xfrm>
+            <a:off x="6072206" y="881034"/>
+            <a:ext cx="428628" cy="428628"/>
+          </a:xfrm>
+          <a:prstGeom prst="ellipse">
+            <a:avLst/>
+          </a:prstGeom>
+        </p:spPr>
+        <p:style>
+          <a:lnRef idx="2">
+            <a:schemeClr val="dk1"/>
+          </a:lnRef>
+          <a:fillRef idx="1">
+            <a:schemeClr val="lt1"/>
+          </a:fillRef>
+          <a:effectRef idx="0">
+            <a:schemeClr val="dk1"/>
+          </a:effectRef>
+          <a:fontRef idx="minor">
+            <a:schemeClr val="dk1"/>
+          </a:fontRef>
+        </p:style>
+        <p:txBody>
+          <a:bodyPr wrap="none" rtlCol="0" anchor="ctr"/>
+          <a:lstStyle/>
+          <a:p>
+            <a:pPr algn="ctr"/>
+            <a:r>
+              <a:rPr lang="en-IN" dirty="0" smtClean="0"/>
+              <a:t>C</a:t>
+            </a:r>
+            <a:endParaRPr lang="en-US" dirty="0"/>
+          </a:p>
+        </p:txBody>
+      </p:sp>
+      <p:sp>
+        <p:nvSpPr>
+          <p:cNvPr id="57" name="Oval 56"/>
+          <p:cNvSpPr/>
+          <p:nvPr/>
+        </p:nvSpPr>
+        <p:spPr>
+          <a:xfrm>
+            <a:off x="428604" y="882620"/>
+            <a:ext cx="428628" cy="428628"/>
+          </a:xfrm>
+          <a:prstGeom prst="ellipse">
+            <a:avLst/>
+          </a:prstGeom>
+        </p:spPr>
+        <p:style>
+          <a:lnRef idx="2">
+            <a:schemeClr val="dk1"/>
+          </a:lnRef>
+          <a:fillRef idx="1">
+            <a:schemeClr val="lt1"/>
+          </a:fillRef>
+          <a:effectRef idx="0">
+            <a:schemeClr val="dk1"/>
+          </a:effectRef>
+          <a:fontRef idx="minor">
+            <a:schemeClr val="dk1"/>
+          </a:fontRef>
+        </p:style>
+        <p:txBody>
+          <a:bodyPr wrap="none" rtlCol="0" anchor="ctr"/>
+          <a:lstStyle/>
+          <a:p>
+            <a:pPr algn="ctr"/>
+            <a:r>
+              <a:rPr lang="en-IN" dirty="0" smtClean="0"/>
+              <a:t>D</a:t>
+            </a:r>
+            <a:endParaRPr lang="en-US" dirty="0"/>
+          </a:p>
+        </p:txBody>
+      </p:sp>
+      <p:cxnSp>
+        <p:nvCxnSpPr>
+          <p:cNvPr id="59" name="Elbow Connector 77"/>
+          <p:cNvCxnSpPr>
+            <a:stCxn id="56" idx="4"/>
+            <a:endCxn id="5" idx="3"/>
+          </p:cNvCxnSpPr>
+          <p:nvPr/>
+        </p:nvCxnSpPr>
+        <p:spPr>
+          <a:xfrm rot="5400000">
+            <a:off x="4214819" y="1488257"/>
+            <a:ext cx="2250297" cy="1893107"/>
+          </a:xfrm>
+          <a:prstGeom prst="bentConnector2">
+            <a:avLst/>
+          </a:prstGeom>
+          <a:ln>
+            <a:tailEnd type="arrow"/>
+          </a:ln>
+        </p:spPr>
+        <p:style>
+          <a:lnRef idx="1">
+            <a:schemeClr val="dk1"/>
+          </a:lnRef>
+          <a:fillRef idx="0">
+            <a:schemeClr val="dk1"/>
+          </a:fillRef>
+          <a:effectRef idx="0">
+            <a:schemeClr val="dk1"/>
+          </a:effectRef>
+          <a:fontRef idx="minor">
+            <a:schemeClr val="tx1"/>
+          </a:fontRef>
+        </p:style>
+      </p:cxnSp>
+      <p:cxnSp>
+        <p:nvCxnSpPr>
+          <p:cNvPr id="62" name="Elbow Connector 77"/>
+          <p:cNvCxnSpPr>
+            <a:stCxn id="55" idx="4"/>
+            <a:endCxn id="2" idx="3"/>
+          </p:cNvCxnSpPr>
+          <p:nvPr/>
+        </p:nvCxnSpPr>
+        <p:spPr>
+          <a:xfrm rot="5400000">
+            <a:off x="4154890" y="1369590"/>
+            <a:ext cx="892975" cy="773118"/>
+          </a:xfrm>
+          <a:prstGeom prst="bentConnector2">
+            <a:avLst/>
+          </a:prstGeom>
+          <a:ln>
+            <a:tailEnd type="arrow"/>
+          </a:ln>
+        </p:spPr>
+        <p:style>
+          <a:lnRef idx="1">
+            <a:schemeClr val="dk1"/>
+          </a:lnRef>
+          <a:fillRef idx="0">
+            <a:schemeClr val="dk1"/>
+          </a:fillRef>
+          <a:effectRef idx="0">
+            <a:schemeClr val="dk1"/>
+          </a:effectRef>
+          <a:fontRef idx="minor">
+            <a:schemeClr val="tx1"/>
+          </a:fontRef>
+        </p:style>
+      </p:cxnSp>
+      <p:cxnSp>
+        <p:nvCxnSpPr>
+          <p:cNvPr id="66" name="Elbow Connector 77"/>
+          <p:cNvCxnSpPr>
+            <a:stCxn id="54" idx="2"/>
+            <a:endCxn id="6" idx="1"/>
+          </p:cNvCxnSpPr>
+          <p:nvPr/>
+        </p:nvCxnSpPr>
+        <p:spPr>
+          <a:xfrm rot="10800000" flipV="1">
+            <a:off x="1607332" y="1095347"/>
+            <a:ext cx="632623" cy="3250429"/>
+          </a:xfrm>
+          <a:prstGeom prst="bentConnector3">
+            <a:avLst>
+              <a:gd name="adj1" fmla="val 136135"/>
+            </a:avLst>
+          </a:prstGeom>
+          <a:ln>
+            <a:tailEnd type="arrow"/>
+          </a:ln>
+        </p:spPr>
+        <p:style>
+          <a:lnRef idx="1">
+            <a:schemeClr val="dk1"/>
+          </a:lnRef>
+          <a:fillRef idx="0">
+            <a:schemeClr val="dk1"/>
+          </a:fillRef>
+          <a:effectRef idx="0">
+            <a:schemeClr val="dk1"/>
+          </a:effectRef>
+          <a:fontRef idx="minor">
+            <a:schemeClr val="tx1"/>
+          </a:fontRef>
+        </p:style>
+      </p:cxnSp>
+      <p:cxnSp>
+        <p:nvCxnSpPr>
+          <p:cNvPr id="73" name="Elbow Connector 77"/>
+          <p:cNvCxnSpPr>
+            <a:stCxn id="44" idx="1"/>
+            <a:endCxn id="57" idx="4"/>
+          </p:cNvCxnSpPr>
+          <p:nvPr/>
+        </p:nvCxnSpPr>
+        <p:spPr>
+          <a:xfrm rot="10800000">
+            <a:off x="642918" y="1311249"/>
+            <a:ext cx="714380" cy="4320413"/>
+          </a:xfrm>
+          <a:prstGeom prst="bentConnector2">
+            <a:avLst/>
+          </a:prstGeom>
+          <a:ln>
+            <a:tailEnd type="arrow"/>
+          </a:ln>
+        </p:spPr>
+        <p:style>
+          <a:lnRef idx="1">
+            <a:schemeClr val="dk1"/>
+          </a:lnRef>
+          <a:fillRef idx="0">
+            <a:schemeClr val="dk1"/>
+          </a:fillRef>
+          <a:effectRef idx="0">
+            <a:schemeClr val="dk1"/>
+          </a:effectRef>
+          <a:fontRef idx="minor">
+            <a:schemeClr val="tx1"/>
+          </a:fontRef>
+        </p:style>
+      </p:cxnSp>
+      <p:cxnSp>
+        <p:nvCxnSpPr>
+          <p:cNvPr id="76" name="Elbow Connector 77"/>
+          <p:cNvCxnSpPr>
+            <a:stCxn id="2" idx="0"/>
+            <a:endCxn id="57" idx="0"/>
+          </p:cNvCxnSpPr>
+          <p:nvPr/>
+        </p:nvCxnSpPr>
+        <p:spPr>
+          <a:xfrm rot="16200000" flipV="1">
+            <a:off x="1429529" y="96009"/>
+            <a:ext cx="784232" cy="2357454"/>
+          </a:xfrm>
+          <a:prstGeom prst="bentConnector3">
+            <a:avLst>
+              <a:gd name="adj1" fmla="val 129150"/>
+            </a:avLst>
+          </a:prstGeom>
+          <a:ln>
+            <a:tailEnd type="arrow"/>
+          </a:ln>
+        </p:spPr>
+        <p:style>
+          <a:lnRef idx="1">
+            <a:schemeClr val="dk1"/>
+          </a:lnRef>
+          <a:fillRef idx="0">
+            <a:schemeClr val="dk1"/>
+          </a:fillRef>
+          <a:effectRef idx="0">
+            <a:schemeClr val="dk1"/>
+          </a:effectRef>
+          <a:fontRef idx="minor">
+            <a:schemeClr val="tx1"/>
+          </a:fontRef>
+        </p:style>
+      </p:cxnSp>
+      <p:cxnSp>
+        <p:nvCxnSpPr>
+          <p:cNvPr id="79" name="Straight Arrow Connector 78"/>
+          <p:cNvCxnSpPr>
+            <a:stCxn id="6" idx="2"/>
+            <a:endCxn id="44" idx="0"/>
+          </p:cNvCxnSpPr>
+          <p:nvPr/>
+        </p:nvCxnSpPr>
+        <p:spPr>
+          <a:xfrm rot="5400000">
+            <a:off x="2857496" y="4738686"/>
+            <a:ext cx="285752" cy="1588"/>
+          </a:xfrm>
+          <a:prstGeom prst="straightConnector1">
+            <a:avLst/>
+          </a:prstGeom>
+          <a:ln>
+            <a:tailEnd type="arrow"/>
+          </a:ln>
+        </p:spPr>
+        <p:style>
+          <a:lnRef idx="1">
+            <a:schemeClr val="dk1"/>
+          </a:lnRef>
+          <a:fillRef idx="0">
+            <a:schemeClr val="dk1"/>
+          </a:fillRef>
+          <a:effectRef idx="0">
+            <a:schemeClr val="dk1"/>
+          </a:effectRef>
+          <a:fontRef idx="minor">
+            <a:schemeClr val="tx1"/>
+          </a:fontRef>
+        </p:style>
+      </p:cxnSp>
+      <p:cxnSp>
+        <p:nvCxnSpPr>
+          <p:cNvPr id="84" name="Straight Arrow Connector 83"/>
+          <p:cNvCxnSpPr>
+            <a:stCxn id="8" idx="2"/>
+            <a:endCxn id="7" idx="0"/>
+          </p:cNvCxnSpPr>
+          <p:nvPr/>
+        </p:nvCxnSpPr>
+        <p:spPr>
+          <a:xfrm rot="16200000" flipH="1">
+            <a:off x="2670018" y="7586039"/>
+            <a:ext cx="714380" cy="20334"/>
+          </a:xfrm>
+          <a:prstGeom prst="straightConnector1">
+            <a:avLst/>
+          </a:prstGeom>
+          <a:ln>
+            <a:tailEnd type="arrow"/>
+          </a:ln>
+        </p:spPr>
+        <p:style>
+          <a:lnRef idx="1">
+            <a:schemeClr val="dk1"/>
+          </a:lnRef>
+          <a:fillRef idx="0">
+            <a:schemeClr val="dk1"/>
+          </a:fillRef>
+          <a:effectRef idx="0">
+            <a:schemeClr val="dk1"/>
+          </a:effectRef>
+          <a:fontRef idx="minor">
+            <a:schemeClr val="tx1"/>
+          </a:fontRef>
+        </p:style>
+      </p:cxnSp>
     </p:spTree>
   </p:cSld>
   <p:clrMapOvr>

</xml_diff>